<commit_message>
Adding the pptx back in
</commit_message>
<xml_diff>
--- a/Single Page Apps with React + Redux.pptx
+++ b/Single Page Apps with React + Redux.pptx
@@ -5,7 +5,7 @@
     <p:sldMasterId id="2147483659" r:id="rId1"/>
   </p:sldMasterIdLst>
   <p:notesMasterIdLst>
-    <p:notesMasterId r:id="rId16"/>
+    <p:notesMasterId r:id="rId18"/>
   </p:notesMasterIdLst>
   <p:sldIdLst>
     <p:sldId id="256" r:id="rId2"/>
@@ -18,10 +18,12 @@
     <p:sldId id="267" r:id="rId9"/>
     <p:sldId id="263" r:id="rId10"/>
     <p:sldId id="264" r:id="rId11"/>
-    <p:sldId id="265" r:id="rId12"/>
-    <p:sldId id="266" r:id="rId13"/>
-    <p:sldId id="269" r:id="rId14"/>
-    <p:sldId id="268" r:id="rId15"/>
+    <p:sldId id="270" r:id="rId12"/>
+    <p:sldId id="271" r:id="rId13"/>
+    <p:sldId id="265" r:id="rId14"/>
+    <p:sldId id="266" r:id="rId15"/>
+    <p:sldId id="269" r:id="rId16"/>
+    <p:sldId id="268" r:id="rId17"/>
   </p:sldIdLst>
   <p:sldSz cx="9144000" cy="5143500" type="screen16x9"/>
   <p:notesSz cx="6858000" cy="9144000"/>
@@ -581,10 +583,7 @@
               </a:spcBef>
               <a:buNone/>
             </a:pPr>
-            <a:r>
-              <a:rPr lang="en-GB"/>
-              <a:t>If you love Ruby and hate that I always make fun of it, here’s your ammo to get back at me.</a:t>
-            </a:r>
+            <a:endParaRPr lang="en-GB"/>
           </a:p>
         </p:txBody>
       </p:sp>
@@ -625,7 +624,7 @@
         </p:nvSpPr>
         <p:spPr>
           <a:xfrm>
-            <a:off x="381300" y="685800"/>
+            <a:off x="381000" y="685800"/>
             <a:ext cx="6096000" cy="3429000"/>
           </a:xfrm>
           <a:custGeom>
@@ -685,63 +684,7 @@
               </a:spcBef>
               <a:buNone/>
             </a:pPr>
-            <a:r>
-              <a:rPr lang="en-GB" dirty="0" smtClean="0"/>
-              <a:t>Actions,</a:t>
-            </a:r>
-            <a:r>
-              <a:rPr lang="en-GB" baseline="0" dirty="0" smtClean="0"/>
-              <a:t> Views – Materially unchanged</a:t>
-            </a:r>
-          </a:p>
-          <a:p>
-            <a:pPr lvl="0">
-              <a:spcBef>
-                <a:spcPts val="0"/>
-              </a:spcBef>
-              <a:buNone/>
-            </a:pPr>
-            <a:r>
-              <a:rPr lang="en-GB" baseline="0" dirty="0" smtClean="0"/>
-              <a:t>Store: Single one holding the single state tree.</a:t>
-            </a:r>
-          </a:p>
-          <a:p>
-            <a:pPr lvl="0">
-              <a:spcBef>
-                <a:spcPts val="0"/>
-              </a:spcBef>
-              <a:buNone/>
-            </a:pPr>
-            <a:r>
-              <a:rPr lang="en-GB" baseline="0" dirty="0" smtClean="0"/>
-              <a:t>Reducers: Pure functions that let us change one portion of the state tree. Each reducer is concerned with a different portion of the state tree.</a:t>
-            </a:r>
-          </a:p>
-          <a:p>
-            <a:pPr lvl="0">
-              <a:spcBef>
-                <a:spcPts val="0"/>
-              </a:spcBef>
-              <a:buNone/>
-            </a:pPr>
-            <a:endParaRPr lang="en-GB" dirty="0" smtClean="0"/>
-          </a:p>
-          <a:p>
-            <a:pPr lvl="0">
-              <a:spcBef>
-                <a:spcPts val="0"/>
-              </a:spcBef>
-              <a:buNone/>
-            </a:pPr>
-            <a:r>
-              <a:rPr lang="en-GB" dirty="0" smtClean="0"/>
-              <a:t>Note</a:t>
-            </a:r>
-            <a:r>
-              <a:rPr lang="en-GB" dirty="0"/>
-              <a:t>: multiple reducers, single store.</a:t>
-            </a:r>
+            <a:endParaRPr lang="en-GB" dirty="0"/>
           </a:p>
         </p:txBody>
       </p:sp>
@@ -758,7 +701,7 @@
   <p:cSld>
     <p:spTree>
       <p:nvGrpSpPr>
-        <p:cNvPr id="1" name="Shape 136"/>
+        <p:cNvPr id="1" name="Shape 120"/>
         <p:cNvGrpSpPr/>
         <p:nvPr/>
       </p:nvGrpSpPr>
@@ -772,108 +715,7 @@
       </p:grpSpPr>
       <p:sp>
         <p:nvSpPr>
-          <p:cNvPr id="137" name="Shape 137"/>
-          <p:cNvSpPr>
-            <a:spLocks noGrp="1" noRot="1" noChangeAspect="1"/>
-          </p:cNvSpPr>
-          <p:nvPr>
-            <p:ph type="sldImg" idx="2"/>
-          </p:nvPr>
-        </p:nvSpPr>
-        <p:spPr>
-          <a:xfrm>
-            <a:off x="381300" y="685800"/>
-            <a:ext cx="6096000" cy="3429000"/>
-          </a:xfrm>
-          <a:custGeom>
-            <a:avLst/>
-            <a:gdLst/>
-            <a:ahLst/>
-            <a:cxnLst/>
-            <a:rect l="0" t="0" r="0" b="0"/>
-            <a:pathLst>
-              <a:path w="120000" h="120000" extrusionOk="0">
-                <a:moveTo>
-                  <a:pt x="0" y="0"/>
-                </a:moveTo>
-                <a:lnTo>
-                  <a:pt x="120000" y="0"/>
-                </a:lnTo>
-                <a:lnTo>
-                  <a:pt x="120000" y="120000"/>
-                </a:lnTo>
-                <a:lnTo>
-                  <a:pt x="0" y="120000"/>
-                </a:lnTo>
-                <a:close/>
-              </a:path>
-            </a:pathLst>
-          </a:custGeom>
-        </p:spPr>
-      </p:sp>
-      <p:sp>
-        <p:nvSpPr>
-          <p:cNvPr id="138" name="Shape 138"/>
-          <p:cNvSpPr txBox="1">
-            <a:spLocks noGrp="1"/>
-          </p:cNvSpPr>
-          <p:nvPr>
-            <p:ph type="body" idx="1"/>
-          </p:nvPr>
-        </p:nvSpPr>
-        <p:spPr>
-          <a:xfrm>
-            <a:off x="685800" y="4343400"/>
-            <a:ext cx="5486400" cy="4114800"/>
-          </a:xfrm>
-          <a:prstGeom prst="rect">
-            <a:avLst/>
-          </a:prstGeom>
-        </p:spPr>
-        <p:txBody>
-          <a:bodyPr lIns="91425" tIns="91425" rIns="91425" bIns="91425" anchor="t" anchorCtr="0">
-            <a:noAutofit/>
-          </a:bodyPr>
-          <a:lstStyle/>
-          <a:p>
-            <a:pPr lvl="0">
-              <a:spcBef>
-                <a:spcPts val="0"/>
-              </a:spcBef>
-              <a:buNone/>
-            </a:pPr>
-            <a:endParaRPr/>
-          </a:p>
-        </p:txBody>
-      </p:sp>
-    </p:spTree>
-  </p:cSld>
-  <p:clrMapOvr>
-    <a:masterClrMapping/>
-  </p:clrMapOvr>
-</p:notes>
-</file>
-
-<file path=ppt/notesSlides/notesSlide12.xml><?xml version="1.0" encoding="utf-8"?>
-<p:notes xmlns:a="http://schemas.openxmlformats.org/drawingml/2006/main" xmlns:r="http://schemas.openxmlformats.org/officeDocument/2006/relationships" xmlns:p="http://schemas.openxmlformats.org/presentationml/2006/main" showMasterSp="0" showMasterPhAnim="0">
-  <p:cSld>
-    <p:spTree>
-      <p:nvGrpSpPr>
-        <p:cNvPr id="1" name="Shape 141"/>
-        <p:cNvGrpSpPr/>
-        <p:nvPr/>
-      </p:nvGrpSpPr>
-      <p:grpSpPr>
-        <a:xfrm>
-          <a:off x="0" y="0"/>
-          <a:ext cx="0" cy="0"/>
-          <a:chOff x="0" y="0"/>
-          <a:chExt cx="0" cy="0"/>
-        </a:xfrm>
-      </p:grpSpPr>
-      <p:sp>
-        <p:nvSpPr>
-          <p:cNvPr id="142" name="Shape 142"/>
+          <p:cNvPr id="121" name="Shape 121"/>
           <p:cNvSpPr>
             <a:spLocks noGrp="1" noRot="1" noChangeAspect="1"/>
           </p:cNvSpPr>
@@ -914,7 +756,7 @@
       </p:sp>
       <p:sp>
         <p:nvSpPr>
-          <p:cNvPr id="143" name="Shape 143"/>
+          <p:cNvPr id="122" name="Shape 122"/>
           <p:cNvSpPr txBox="1">
             <a:spLocks noGrp="1"/>
           </p:cNvSpPr>
@@ -937,13 +779,114 @@
           </a:bodyPr>
           <a:lstStyle/>
           <a:p>
-            <a:pPr lvl="0" rtl="0">
+            <a:pPr lvl="0">
               <a:spcBef>
                 <a:spcPts val="0"/>
               </a:spcBef>
               <a:buNone/>
             </a:pPr>
-            <a:endParaRPr/>
+            <a:endParaRPr lang="en-GB" dirty="0"/>
+          </a:p>
+        </p:txBody>
+      </p:sp>
+    </p:spTree>
+  </p:cSld>
+  <p:clrMapOvr>
+    <a:masterClrMapping/>
+  </p:clrMapOvr>
+</p:notes>
+</file>
+
+<file path=ppt/notesSlides/notesSlide12.xml><?xml version="1.0" encoding="utf-8"?>
+<p:notes xmlns:a="http://schemas.openxmlformats.org/drawingml/2006/main" xmlns:r="http://schemas.openxmlformats.org/officeDocument/2006/relationships" xmlns:p="http://schemas.openxmlformats.org/presentationml/2006/main" showMasterSp="0" showMasterPhAnim="0">
+  <p:cSld>
+    <p:spTree>
+      <p:nvGrpSpPr>
+        <p:cNvPr id="1" name="Shape 120"/>
+        <p:cNvGrpSpPr/>
+        <p:nvPr/>
+      </p:nvGrpSpPr>
+      <p:grpSpPr>
+        <a:xfrm>
+          <a:off x="0" y="0"/>
+          <a:ext cx="0" cy="0"/>
+          <a:chOff x="0" y="0"/>
+          <a:chExt cx="0" cy="0"/>
+        </a:xfrm>
+      </p:grpSpPr>
+      <p:sp>
+        <p:nvSpPr>
+          <p:cNvPr id="121" name="Shape 121"/>
+          <p:cNvSpPr>
+            <a:spLocks noGrp="1" noRot="1" noChangeAspect="1"/>
+          </p:cNvSpPr>
+          <p:nvPr>
+            <p:ph type="sldImg" idx="2"/>
+          </p:nvPr>
+        </p:nvSpPr>
+        <p:spPr>
+          <a:xfrm>
+            <a:off x="381000" y="685800"/>
+            <a:ext cx="6096000" cy="3429000"/>
+          </a:xfrm>
+          <a:custGeom>
+            <a:avLst/>
+            <a:gdLst/>
+            <a:ahLst/>
+            <a:cxnLst/>
+            <a:rect l="0" t="0" r="0" b="0"/>
+            <a:pathLst>
+              <a:path w="120000" h="120000" extrusionOk="0">
+                <a:moveTo>
+                  <a:pt x="0" y="0"/>
+                </a:moveTo>
+                <a:lnTo>
+                  <a:pt x="120000" y="0"/>
+                </a:lnTo>
+                <a:lnTo>
+                  <a:pt x="120000" y="120000"/>
+                </a:lnTo>
+                <a:lnTo>
+                  <a:pt x="0" y="120000"/>
+                </a:lnTo>
+                <a:close/>
+              </a:path>
+            </a:pathLst>
+          </a:custGeom>
+        </p:spPr>
+      </p:sp>
+      <p:sp>
+        <p:nvSpPr>
+          <p:cNvPr id="122" name="Shape 122"/>
+          <p:cNvSpPr txBox="1">
+            <a:spLocks noGrp="1"/>
+          </p:cNvSpPr>
+          <p:nvPr>
+            <p:ph type="body" idx="1"/>
+          </p:nvPr>
+        </p:nvSpPr>
+        <p:spPr>
+          <a:xfrm>
+            <a:off x="685800" y="4343400"/>
+            <a:ext cx="5486400" cy="4114800"/>
+          </a:xfrm>
+          <a:prstGeom prst="rect">
+            <a:avLst/>
+          </a:prstGeom>
+        </p:spPr>
+        <p:txBody>
+          <a:bodyPr lIns="91425" tIns="91425" rIns="91425" bIns="91425" anchor="t" anchorCtr="0">
+            <a:noAutofit/>
+          </a:bodyPr>
+          <a:lstStyle/>
+          <a:p>
+            <a:pPr lvl="0">
+              <a:spcBef>
+                <a:spcPts val="0"/>
+              </a:spcBef>
+              <a:buNone/>
+            </a:pPr>
+            <a:endParaRPr lang="en-GB" dirty="0"/>
           </a:p>
         </p:txBody>
       </p:sp>
@@ -984,7 +927,7 @@
         </p:nvSpPr>
         <p:spPr>
           <a:xfrm>
-            <a:off x="381000" y="685800"/>
+            <a:off x="381300" y="685800"/>
             <a:ext cx="6096000" cy="3429000"/>
           </a:xfrm>
           <a:custGeom>
@@ -1157,6 +1100,208 @@
 </p:notes>
 </file>
 
+<file path=ppt/notesSlides/notesSlide15.xml><?xml version="1.0" encoding="utf-8"?>
+<p:notes xmlns:a="http://schemas.openxmlformats.org/drawingml/2006/main" xmlns:r="http://schemas.openxmlformats.org/officeDocument/2006/relationships" xmlns:p="http://schemas.openxmlformats.org/presentationml/2006/main" showMasterSp="0" showMasterPhAnim="0">
+  <p:cSld>
+    <p:spTree>
+      <p:nvGrpSpPr>
+        <p:cNvPr id="1" name="Shape 136"/>
+        <p:cNvGrpSpPr/>
+        <p:nvPr/>
+      </p:nvGrpSpPr>
+      <p:grpSpPr>
+        <a:xfrm>
+          <a:off x="0" y="0"/>
+          <a:ext cx="0" cy="0"/>
+          <a:chOff x="0" y="0"/>
+          <a:chExt cx="0" cy="0"/>
+        </a:xfrm>
+      </p:grpSpPr>
+      <p:sp>
+        <p:nvSpPr>
+          <p:cNvPr id="137" name="Shape 137"/>
+          <p:cNvSpPr>
+            <a:spLocks noGrp="1" noRot="1" noChangeAspect="1"/>
+          </p:cNvSpPr>
+          <p:nvPr>
+            <p:ph type="sldImg" idx="2"/>
+          </p:nvPr>
+        </p:nvSpPr>
+        <p:spPr>
+          <a:xfrm>
+            <a:off x="381000" y="685800"/>
+            <a:ext cx="6096000" cy="3429000"/>
+          </a:xfrm>
+          <a:custGeom>
+            <a:avLst/>
+            <a:gdLst/>
+            <a:ahLst/>
+            <a:cxnLst/>
+            <a:rect l="0" t="0" r="0" b="0"/>
+            <a:pathLst>
+              <a:path w="120000" h="120000" extrusionOk="0">
+                <a:moveTo>
+                  <a:pt x="0" y="0"/>
+                </a:moveTo>
+                <a:lnTo>
+                  <a:pt x="120000" y="0"/>
+                </a:lnTo>
+                <a:lnTo>
+                  <a:pt x="120000" y="120000"/>
+                </a:lnTo>
+                <a:lnTo>
+                  <a:pt x="0" y="120000"/>
+                </a:lnTo>
+                <a:close/>
+              </a:path>
+            </a:pathLst>
+          </a:custGeom>
+        </p:spPr>
+      </p:sp>
+      <p:sp>
+        <p:nvSpPr>
+          <p:cNvPr id="138" name="Shape 138"/>
+          <p:cNvSpPr txBox="1">
+            <a:spLocks noGrp="1"/>
+          </p:cNvSpPr>
+          <p:nvPr>
+            <p:ph type="body" idx="1"/>
+          </p:nvPr>
+        </p:nvSpPr>
+        <p:spPr>
+          <a:xfrm>
+            <a:off x="685800" y="4343400"/>
+            <a:ext cx="5486400" cy="4114800"/>
+          </a:xfrm>
+          <a:prstGeom prst="rect">
+            <a:avLst/>
+          </a:prstGeom>
+        </p:spPr>
+        <p:txBody>
+          <a:bodyPr lIns="91425" tIns="91425" rIns="91425" bIns="91425" anchor="t" anchorCtr="0">
+            <a:noAutofit/>
+          </a:bodyPr>
+          <a:lstStyle/>
+          <a:p>
+            <a:pPr lvl="0">
+              <a:spcBef>
+                <a:spcPts val="0"/>
+              </a:spcBef>
+              <a:buNone/>
+            </a:pPr>
+            <a:endParaRPr/>
+          </a:p>
+        </p:txBody>
+      </p:sp>
+    </p:spTree>
+  </p:cSld>
+  <p:clrMapOvr>
+    <a:masterClrMapping/>
+  </p:clrMapOvr>
+</p:notes>
+</file>
+
+<file path=ppt/notesSlides/notesSlide16.xml><?xml version="1.0" encoding="utf-8"?>
+<p:notes xmlns:a="http://schemas.openxmlformats.org/drawingml/2006/main" xmlns:r="http://schemas.openxmlformats.org/officeDocument/2006/relationships" xmlns:p="http://schemas.openxmlformats.org/presentationml/2006/main" showMasterSp="0" showMasterPhAnim="0">
+  <p:cSld>
+    <p:spTree>
+      <p:nvGrpSpPr>
+        <p:cNvPr id="1" name="Shape 141"/>
+        <p:cNvGrpSpPr/>
+        <p:nvPr/>
+      </p:nvGrpSpPr>
+      <p:grpSpPr>
+        <a:xfrm>
+          <a:off x="0" y="0"/>
+          <a:ext cx="0" cy="0"/>
+          <a:chOff x="0" y="0"/>
+          <a:chExt cx="0" cy="0"/>
+        </a:xfrm>
+      </p:grpSpPr>
+      <p:sp>
+        <p:nvSpPr>
+          <p:cNvPr id="142" name="Shape 142"/>
+          <p:cNvSpPr>
+            <a:spLocks noGrp="1" noRot="1" noChangeAspect="1"/>
+          </p:cNvSpPr>
+          <p:nvPr>
+            <p:ph type="sldImg" idx="2"/>
+          </p:nvPr>
+        </p:nvSpPr>
+        <p:spPr>
+          <a:xfrm>
+            <a:off x="381000" y="685800"/>
+            <a:ext cx="6096000" cy="3429000"/>
+          </a:xfrm>
+          <a:custGeom>
+            <a:avLst/>
+            <a:gdLst/>
+            <a:ahLst/>
+            <a:cxnLst/>
+            <a:rect l="0" t="0" r="0" b="0"/>
+            <a:pathLst>
+              <a:path w="120000" h="120000" extrusionOk="0">
+                <a:moveTo>
+                  <a:pt x="0" y="0"/>
+                </a:moveTo>
+                <a:lnTo>
+                  <a:pt x="120000" y="0"/>
+                </a:lnTo>
+                <a:lnTo>
+                  <a:pt x="120000" y="120000"/>
+                </a:lnTo>
+                <a:lnTo>
+                  <a:pt x="0" y="120000"/>
+                </a:lnTo>
+                <a:close/>
+              </a:path>
+            </a:pathLst>
+          </a:custGeom>
+        </p:spPr>
+      </p:sp>
+      <p:sp>
+        <p:nvSpPr>
+          <p:cNvPr id="143" name="Shape 143"/>
+          <p:cNvSpPr txBox="1">
+            <a:spLocks noGrp="1"/>
+          </p:cNvSpPr>
+          <p:nvPr>
+            <p:ph type="body" idx="1"/>
+          </p:nvPr>
+        </p:nvSpPr>
+        <p:spPr>
+          <a:xfrm>
+            <a:off x="685800" y="4343400"/>
+            <a:ext cx="5486400" cy="4114800"/>
+          </a:xfrm>
+          <a:prstGeom prst="rect">
+            <a:avLst/>
+          </a:prstGeom>
+        </p:spPr>
+        <p:txBody>
+          <a:bodyPr lIns="91425" tIns="91425" rIns="91425" bIns="91425" anchor="t" anchorCtr="0">
+            <a:noAutofit/>
+          </a:bodyPr>
+          <a:lstStyle/>
+          <a:p>
+            <a:pPr lvl="0" rtl="0">
+              <a:spcBef>
+                <a:spcPts val="0"/>
+              </a:spcBef>
+              <a:buNone/>
+            </a:pPr>
+            <a:endParaRPr/>
+          </a:p>
+        </p:txBody>
+      </p:sp>
+    </p:spTree>
+  </p:cSld>
+  <p:clrMapOvr>
+    <a:masterClrMapping/>
+  </p:clrMapOvr>
+</p:notes>
+</file>
+
 <file path=ppt/notesSlides/notesSlide2.xml><?xml version="1.0" encoding="utf-8"?>
 <p:notes xmlns:a="http://schemas.openxmlformats.org/drawingml/2006/main" xmlns:r="http://schemas.openxmlformats.org/officeDocument/2006/relationships" xmlns:p="http://schemas.openxmlformats.org/presentationml/2006/main" showMasterSp="0" showMasterPhAnim="0">
   <p:cSld>
@@ -1246,52 +1391,7 @@
               </a:spcBef>
               <a:buNone/>
             </a:pPr>
-            <a:r>
-              <a:rPr lang="en-GB"/>
-              <a:t>We have 2 hours, so let’s try to zoom through this as quick as possible, allowing time for questions.</a:t>
-            </a:r>
-          </a:p>
-          <a:p>
-            <a:pPr lvl="0">
-              <a:spcBef>
-                <a:spcPts val="0"/>
-              </a:spcBef>
-              <a:buNone/>
-            </a:pPr>
-            <a:endParaRPr/>
-          </a:p>
-          <a:p>
-            <a:pPr lvl="0">
-              <a:spcBef>
-                <a:spcPts val="0"/>
-              </a:spcBef>
-              <a:buNone/>
-            </a:pPr>
-            <a:r>
-              <a:rPr lang="en-GB"/>
-              <a:t>I tend to say “stop me if you have random questions”, but for the sake of time, today’s rule is “stop me if I said something that makes no sense, but save question period, and time after this lecture to get clarification”</a:t>
-            </a:r>
-          </a:p>
-          <a:p>
-            <a:pPr lvl="0">
-              <a:spcBef>
-                <a:spcPts val="0"/>
-              </a:spcBef>
-              <a:buNone/>
-            </a:pPr>
-            <a:endParaRPr/>
-          </a:p>
-          <a:p>
-            <a:pPr lvl="0">
-              <a:spcBef>
-                <a:spcPts val="0"/>
-              </a:spcBef>
-              <a:buNone/>
-            </a:pPr>
-            <a:r>
-              <a:rPr lang="en-GB"/>
-              <a:t>Caveats: I’m not covering React Router, on purpose. They recently changed the API for React-Redux-Router in stupid ways (ie, changing routeReducer method to routerReducer) and I borked my own app upgrading, so I’m currently not friends with it.</a:t>
-            </a:r>
+            <a:endParaRPr lang="en-GB"/>
           </a:p>
         </p:txBody>
       </p:sp>
@@ -1392,10 +1492,7 @@
               </a:spcBef>
               <a:buNone/>
             </a:pPr>
-            <a:r>
-              <a:rPr lang="en-GB"/>
-              <a:t>There will be pieces of revision since Salis has gone over a bunch of this stuff. His next lecture will also probably cover a bunch of other things that overlap, including build tools. I’ll try to keep the overlap to a minimum.</a:t>
-            </a:r>
+            <a:endParaRPr lang="en-GB"/>
           </a:p>
         </p:txBody>
       </p:sp>
@@ -1436,7 +1533,7 @@
         </p:nvSpPr>
         <p:spPr>
           <a:xfrm>
-            <a:off x="381300" y="685800"/>
+            <a:off x="381000" y="685800"/>
             <a:ext cx="6096000" cy="3429000"/>
           </a:xfrm>
           <a:custGeom>
@@ -1496,97 +1593,7 @@
               </a:spcBef>
               <a:buNone/>
             </a:pPr>
-            <a:r>
-              <a:rPr lang="en-GB"/>
-              <a:t>Rich in that, if you can make good ones, you’ll get rich!</a:t>
-            </a:r>
-          </a:p>
-          <a:p>
-            <a:pPr lvl="0">
-              <a:spcBef>
-                <a:spcPts val="0"/>
-              </a:spcBef>
-              <a:buNone/>
-            </a:pPr>
-            <a:r>
-              <a:rPr lang="en-GB"/>
-              <a:t>JK. About interaction and user-driven I/O</a:t>
-            </a:r>
-          </a:p>
-          <a:p>
-            <a:pPr lvl="0">
-              <a:spcBef>
-                <a:spcPts val="0"/>
-              </a:spcBef>
-              <a:buNone/>
-            </a:pPr>
-            <a:endParaRPr/>
-          </a:p>
-          <a:p>
-            <a:pPr lvl="0">
-              <a:spcBef>
-                <a:spcPts val="0"/>
-              </a:spcBef>
-              <a:buNone/>
-            </a:pPr>
-            <a:r>
-              <a:rPr lang="en-GB"/>
-              <a:t>Single html page = index.html. In the case of React apps, we mount them to a specific DOM node using the render method of React-dom.</a:t>
-            </a:r>
-          </a:p>
-          <a:p>
-            <a:pPr lvl="0">
-              <a:spcBef>
-                <a:spcPts val="0"/>
-              </a:spcBef>
-              <a:buNone/>
-            </a:pPr>
-            <a:endParaRPr/>
-          </a:p>
-          <a:p>
-            <a:pPr lvl="0">
-              <a:spcBef>
-                <a:spcPts val="0"/>
-              </a:spcBef>
-              <a:buNone/>
-            </a:pPr>
-            <a:r>
-              <a:rPr lang="en-GB"/>
-              <a:t>HTML5 because really the internet kind of sucked before HTML5, and it gives us shiny things like Animations, WebSockets, and making JS not horrible!</a:t>
-            </a:r>
-          </a:p>
-          <a:p>
-            <a:pPr lvl="0">
-              <a:spcBef>
-                <a:spcPts val="0"/>
-              </a:spcBef>
-              <a:buNone/>
-            </a:pPr>
-            <a:endParaRPr/>
-          </a:p>
-          <a:p>
-            <a:pPr lvl="0">
-              <a:spcBef>
-                <a:spcPts val="0"/>
-              </a:spcBef>
-              <a:buNone/>
-            </a:pPr>
-            <a:r>
-              <a:rPr lang="en-GB"/>
-              <a:t>AJAX = XHR. Fetch is future.</a:t>
-            </a:r>
-          </a:p>
-          <a:p>
-            <a:pPr lvl="0">
-              <a:spcBef>
-                <a:spcPts val="0"/>
-              </a:spcBef>
-              <a:buNone/>
-            </a:pPr>
-            <a:r>
-              <a:rPr lang="en-GB"/>
-              <a:t>SOA = Service-Oriented-Architecture that I’m not going into now because I can talk for years about it.</a:t>
-            </a:r>
+            <a:endParaRPr lang="en-GB"/>
           </a:p>
         </p:txBody>
       </p:sp>
@@ -1627,7 +1634,7 @@
         </p:nvSpPr>
         <p:spPr>
           <a:xfrm>
-            <a:off x="381300" y="685800"/>
+            <a:off x="381000" y="685800"/>
             <a:ext cx="6096000" cy="3429000"/>
           </a:xfrm>
           <a:custGeom>
@@ -1687,88 +1694,7 @@
               </a:spcBef>
               <a:buNone/>
             </a:pPr>
-            <a:r>
-              <a:rPr lang="en-GB"/>
-              <a:t>ES6 is the current version of the JS language, but not fully supported (aka ES2015)</a:t>
-            </a:r>
-          </a:p>
-          <a:p>
-            <a:pPr lvl="0">
-              <a:spcBef>
-                <a:spcPts val="0"/>
-              </a:spcBef>
-              <a:buNone/>
-            </a:pPr>
-            <a:r>
-              <a:rPr lang="en-GB"/>
-              <a:t>ES7 is next (ES2016)</a:t>
-            </a:r>
-          </a:p>
-          <a:p>
-            <a:pPr lvl="0">
-              <a:spcBef>
-                <a:spcPts val="0"/>
-              </a:spcBef>
-              <a:buNone/>
-            </a:pPr>
-            <a:r>
-              <a:rPr lang="en-GB"/>
-              <a:t>ES8 is ????</a:t>
-            </a:r>
-          </a:p>
-          <a:p>
-            <a:pPr lvl="0">
-              <a:spcBef>
-                <a:spcPts val="0"/>
-              </a:spcBef>
-              <a:buNone/>
-            </a:pPr>
-            <a:endParaRPr/>
-          </a:p>
-          <a:p>
-            <a:pPr lvl="0">
-              <a:spcBef>
-                <a:spcPts val="0"/>
-              </a:spcBef>
-              <a:buNone/>
-            </a:pPr>
-            <a:r>
-              <a:rPr lang="en-GB"/>
-              <a:t>Babel is a transpiling library/utility written by a 17-year-old Australian kid who was bored. Seriously.</a:t>
-            </a:r>
-          </a:p>
-          <a:p>
-            <a:pPr lvl="0">
-              <a:spcBef>
-                <a:spcPts val="0"/>
-              </a:spcBef>
-              <a:buNone/>
-            </a:pPr>
-            <a:endParaRPr/>
-          </a:p>
-          <a:p>
-            <a:pPr lvl="0">
-              <a:spcBef>
-                <a:spcPts val="0"/>
-              </a:spcBef>
-              <a:buNone/>
-            </a:pPr>
-            <a:r>
-              <a:rPr lang="en-GB"/>
-              <a:t>Transpiling = taking code that is written in one language, and convert it into code written in another language without changing any abstraction</a:t>
-            </a:r>
-          </a:p>
-          <a:p>
-            <a:pPr lvl="0">
-              <a:spcBef>
-                <a:spcPts val="0"/>
-              </a:spcBef>
-              <a:buNone/>
-            </a:pPr>
-            <a:r>
-              <a:rPr lang="en-GB"/>
-              <a:t>Code buidling = require() in node (CommonJS), but going to be native, with the import statement</a:t>
-            </a:r>
+            <a:endParaRPr lang="en-GB"/>
           </a:p>
         </p:txBody>
       </p:sp>
@@ -1869,97 +1795,7 @@
               </a:spcBef>
               <a:buNone/>
             </a:pPr>
-            <a:r>
-              <a:rPr lang="en-GB"/>
-              <a:t>React is an awesome library for sure, but you can use the Flux pattern outside of React. A couple companies I know are doing their Angular apps in a very flux-y way. It’s kinda cool, but I’m such a React fanboy that I’ve dismissed their attempts for no good reason.</a:t>
-            </a:r>
-          </a:p>
-          <a:p>
-            <a:pPr lvl="0">
-              <a:spcBef>
-                <a:spcPts val="0"/>
-              </a:spcBef>
-              <a:buNone/>
-            </a:pPr>
-            <a:endParaRPr/>
-          </a:p>
-          <a:p>
-            <a:pPr lvl="0">
-              <a:spcBef>
-                <a:spcPts val="0"/>
-              </a:spcBef>
-              <a:buNone/>
-            </a:pPr>
-            <a:r>
-              <a:rPr lang="en-GB"/>
-              <a:t>See me later for more elaboration on why I dislike MVC as a pattern for client-side applications. If I’m busy, ask Trevor</a:t>
-            </a:r>
-          </a:p>
-          <a:p>
-            <a:pPr lvl="0">
-              <a:spcBef>
-                <a:spcPts val="0"/>
-              </a:spcBef>
-              <a:buNone/>
-            </a:pPr>
-            <a:endParaRPr/>
-          </a:p>
-          <a:p>
-            <a:pPr lvl="0">
-              <a:spcBef>
-                <a:spcPts val="0"/>
-              </a:spcBef>
-              <a:buNone/>
-            </a:pPr>
-            <a:r>
-              <a:rPr lang="en-GB"/>
-              <a:t>Routing -&gt; typically handled by webserver using HTTP. When you GET a location, the webserver responds with the appropriate page.</a:t>
-            </a:r>
-          </a:p>
-          <a:p>
-            <a:pPr lvl="0">
-              <a:spcBef>
-                <a:spcPts val="0"/>
-              </a:spcBef>
-              <a:buNone/>
-            </a:pPr>
-            <a:r>
-              <a:rPr lang="en-GB"/>
-              <a:t>Client-side -&gt; using javascript, we grab the url and serve up different views</a:t>
-            </a:r>
-          </a:p>
-          <a:p>
-            <a:pPr lvl="0">
-              <a:spcBef>
-                <a:spcPts val="0"/>
-              </a:spcBef>
-              <a:buNone/>
-            </a:pPr>
-            <a:endParaRPr/>
-          </a:p>
-          <a:p>
-            <a:pPr lvl="0">
-              <a:spcBef>
-                <a:spcPts val="0"/>
-              </a:spcBef>
-              <a:buNone/>
-            </a:pPr>
-            <a:r>
-              <a:rPr lang="en-GB"/>
-              <a:t>Webpack, which you will hate 50% of the time, but love the other 50%</a:t>
-            </a:r>
-          </a:p>
-          <a:p>
-            <a:pPr lvl="0">
-              <a:spcBef>
-                <a:spcPts val="0"/>
-              </a:spcBef>
-              <a:buNone/>
-            </a:pPr>
-            <a:r>
-              <a:rPr lang="en-GB"/>
-              <a:t>Offers us hot module reloading, and generally sucks the least.</a:t>
-            </a:r>
+            <a:endParaRPr lang="en-GB"/>
           </a:p>
         </p:txBody>
       </p:sp>
@@ -2060,10 +1896,7 @@
               </a:spcBef>
               <a:buNone/>
             </a:pPr>
-            <a:r>
-              <a:rPr lang="en-GB"/>
-              <a:t>Pub/Sub is a wicked wicked design pattern.</a:t>
-            </a:r>
+            <a:endParaRPr lang="en-GB"/>
           </a:p>
         </p:txBody>
       </p:sp>
@@ -2164,10 +1997,7 @@
               </a:spcBef>
               <a:buNone/>
             </a:pPr>
-            <a:r>
-              <a:rPr lang="en-GB" dirty="0"/>
-              <a:t>Pub/Sub is a wicked wicked design pattern.</a:t>
-            </a:r>
+            <a:endParaRPr lang="en-GB" dirty="0"/>
           </a:p>
         </p:txBody>
       </p:sp>
@@ -2268,55 +2098,7 @@
               </a:spcBef>
               <a:buNone/>
             </a:pPr>
-            <a:r>
-              <a:rPr lang="en-GB"/>
-              <a:t>Actions -&gt; an object that has at least 1 property -- the type, which is a string constant</a:t>
-            </a:r>
-          </a:p>
-          <a:p>
-            <a:pPr lvl="0">
-              <a:spcBef>
-                <a:spcPts val="0"/>
-              </a:spcBef>
-              <a:buNone/>
-            </a:pPr>
-            <a:r>
-              <a:rPr lang="en-GB"/>
-              <a:t>Dispatcher -&gt; Consumes an action, and using pub/sub, pushes it to the subscribed stores</a:t>
-            </a:r>
-          </a:p>
-          <a:p>
-            <a:pPr lvl="0">
-              <a:spcBef>
-                <a:spcPts val="0"/>
-              </a:spcBef>
-              <a:buNone/>
-            </a:pPr>
-            <a:r>
-              <a:rPr lang="en-GB"/>
-              <a:t>Dispatcher is a black box. We can go look at source, but who wants to do that?</a:t>
-            </a:r>
-          </a:p>
-          <a:p>
-            <a:pPr lvl="0">
-              <a:spcBef>
-                <a:spcPts val="0"/>
-              </a:spcBef>
-              <a:buNone/>
-            </a:pPr>
-            <a:endParaRPr/>
-          </a:p>
-          <a:p>
-            <a:pPr lvl="0">
-              <a:spcBef>
-                <a:spcPts val="0"/>
-              </a:spcBef>
-              <a:buNone/>
-            </a:pPr>
-            <a:r>
-              <a:rPr lang="en-GB"/>
-              <a:t>Stores are subscribed to dispatcher, views are subscribed to store. When an action hits a store, it updates the state (object), and emits an event that the views are listening for. Confused yet? Yah, welcome to why Flux is shit.</a:t>
-            </a:r>
+            <a:endParaRPr lang="en-GB"/>
           </a:p>
         </p:txBody>
       </p:sp>
@@ -6161,7 +5943,7 @@
               <a:buNone/>
             </a:pPr>
             <a:r>
-              <a:rPr lang="en-GB"/>
+              <a:rPr lang="en-GB" dirty="0"/>
               <a:t>Single Page Apps with React + Redux </a:t>
             </a:r>
           </a:p>
@@ -6199,9 +5981,14 @@
               <a:buNone/>
             </a:pPr>
             <a:r>
-              <a:rPr lang="en-GB"/>
-              <a:t>Hopefully including intros to Babel and Webpack</a:t>
-            </a:r>
+              <a:rPr lang="en-GB" dirty="0"/>
+              <a:t>Hopefully including intros to Babel and </a:t>
+            </a:r>
+            <a:r>
+              <a:rPr lang="en-GB" dirty="0" err="1"/>
+              <a:t>Webpack</a:t>
+            </a:r>
+            <a:endParaRPr lang="en-GB" dirty="0"/>
           </a:p>
         </p:txBody>
       </p:sp>
@@ -6696,7 +6483,7 @@
   <p:cSld>
     <p:spTree>
       <p:nvGrpSpPr>
-        <p:cNvPr id="1" name="Shape 139"/>
+        <p:cNvPr id="1" name="Shape 123"/>
         <p:cNvGrpSpPr/>
         <p:nvPr/>
       </p:nvGrpSpPr>
@@ -6708,82 +6495,33 @@
           <a:chExt cx="0" cy="0"/>
         </a:xfrm>
       </p:grpSpPr>
-      <p:sp>
-        <p:nvSpPr>
-          <p:cNvPr id="140" name="Shape 140"/>
-          <p:cNvSpPr txBox="1">
-            <a:spLocks noGrp="1"/>
-          </p:cNvSpPr>
-          <p:nvPr>
-            <p:ph type="title"/>
-          </p:nvPr>
-        </p:nvSpPr>
+      <p:pic>
+        <p:nvPicPr>
+          <p:cNvPr id="2" name="Picture 1"/>
+          <p:cNvPicPr>
+            <a:picLocks noChangeAspect="1"/>
+          </p:cNvPicPr>
+          <p:nvPr/>
+        </p:nvPicPr>
+        <p:blipFill>
+          <a:blip r:embed="rId3"/>
+          <a:stretch>
+            <a:fillRect/>
+          </a:stretch>
+        </p:blipFill>
         <p:spPr>
-          <a:xfrm>
-            <a:off x="671250" y="2141250"/>
-            <a:ext cx="7852200" cy="861000"/>
+          <a:xfrm rot="645849">
+            <a:off x="3983672" y="2862087"/>
+            <a:ext cx="2727100" cy="2727100"/>
           </a:xfrm>
           <a:prstGeom prst="rect">
             <a:avLst/>
           </a:prstGeom>
         </p:spPr>
-        <p:txBody>
-          <a:bodyPr lIns="91425" tIns="91425" rIns="91425" bIns="91425" anchor="ctr" anchorCtr="0">
-            <a:noAutofit/>
-          </a:bodyPr>
-          <a:lstStyle/>
-          <a:p>
-            <a:pPr lvl="0">
-              <a:spcBef>
-                <a:spcPts val="0"/>
-              </a:spcBef>
-              <a:buNone/>
-            </a:pPr>
-            <a:r>
-              <a:rPr lang="en-GB"/>
-              <a:t>First questions, then a 10-minute break...</a:t>
-            </a:r>
-          </a:p>
-        </p:txBody>
-      </p:sp>
-    </p:spTree>
-  </p:cSld>
-  <p:clrMapOvr>
-    <a:masterClrMapping/>
-  </p:clrMapOvr>
-  <p:transition xmlns:p14="http://schemas.microsoft.com/office/powerpoint/2010/main" spd="slow">
-    <p:cut/>
-  </p:transition>
-  <p:timing>
-    <p:tnLst>
-      <p:par>
-        <p:cTn xmlns:p14="http://schemas.microsoft.com/office/powerpoint/2010/main" id="1" dur="indefinite" restart="never" nodeType="tmRoot"/>
-      </p:par>
-    </p:tnLst>
-  </p:timing>
-</p:sld>
-</file>
-
-<file path=ppt/slides/slide12.xml><?xml version="1.0" encoding="utf-8"?>
-<p:sld xmlns:a="http://schemas.openxmlformats.org/drawingml/2006/main" xmlns:r="http://schemas.openxmlformats.org/officeDocument/2006/relationships" xmlns:p="http://schemas.openxmlformats.org/presentationml/2006/main">
-  <p:cSld>
-    <p:spTree>
-      <p:nvGrpSpPr>
-        <p:cNvPr id="1" name="Shape 144"/>
-        <p:cNvGrpSpPr/>
-        <p:nvPr/>
-      </p:nvGrpSpPr>
-      <p:grpSpPr>
-        <a:xfrm>
-          <a:off x="0" y="0"/>
-          <a:ext cx="0" cy="0"/>
-          <a:chOff x="0" y="0"/>
-          <a:chExt cx="0" cy="0"/>
-        </a:xfrm>
-      </p:grpSpPr>
+      </p:pic>
       <p:sp>
         <p:nvSpPr>
-          <p:cNvPr id="145" name="Shape 145"/>
+          <p:cNvPr id="124" name="Shape 124"/>
           <p:cNvSpPr txBox="1">
             <a:spLocks noGrp="1"/>
           </p:cNvSpPr>
@@ -6806,7 +6544,7 @@
           </a:bodyPr>
           <a:lstStyle/>
           <a:p>
-            <a:pPr lvl="0" rtl="0">
+            <a:pPr lvl="0">
               <a:spcBef>
                 <a:spcPts val="0"/>
               </a:spcBef>
@@ -6814,25 +6552,469 @@
             </a:pPr>
             <a:r>
               <a:rPr lang="en-GB"/>
-              <a:t>Agenda</a:t>
+              <a:t>Redux, and why it’s better (in my opinion…)</a:t>
             </a:r>
           </a:p>
         </p:txBody>
       </p:sp>
+      <p:grpSp>
+        <p:nvGrpSpPr>
+          <p:cNvPr id="125" name="Shape 125"/>
+          <p:cNvGrpSpPr/>
+          <p:nvPr/>
+        </p:nvGrpSpPr>
+        <p:grpSpPr>
+          <a:xfrm>
+            <a:off x="938812" y="1605200"/>
+            <a:ext cx="7266375" cy="1760600"/>
+            <a:chOff x="560950" y="1605200"/>
+            <a:chExt cx="7266375" cy="1760600"/>
+          </a:xfrm>
+        </p:grpSpPr>
+        <p:sp>
+          <p:nvSpPr>
+            <p:cNvPr id="126" name="Shape 126"/>
+            <p:cNvSpPr/>
+            <p:nvPr/>
+          </p:nvSpPr>
+          <p:spPr>
+            <a:xfrm>
+              <a:off x="560950" y="2727100"/>
+              <a:ext cx="1467000" cy="638700"/>
+            </a:xfrm>
+            <a:prstGeom prst="roundRect">
+              <a:avLst>
+                <a:gd name="adj" fmla="val 16667"/>
+              </a:avLst>
+            </a:prstGeom>
+            <a:solidFill>
+              <a:srgbClr val="FFFFFF"/>
+            </a:solidFill>
+            <a:ln>
+              <a:noFill/>
+            </a:ln>
+          </p:spPr>
+          <p:txBody>
+            <a:bodyPr lIns="91425" tIns="91425" rIns="91425" bIns="91425" anchor="ctr" anchorCtr="0">
+              <a:noAutofit/>
+            </a:bodyPr>
+            <a:lstStyle/>
+            <a:p>
+              <a:pPr lvl="0" algn="ctr" rtl="0">
+                <a:spcBef>
+                  <a:spcPts val="0"/>
+                </a:spcBef>
+                <a:buNone/>
+              </a:pPr>
+              <a:r>
+                <a:rPr lang="en-GB" sz="1800" b="1">
+                  <a:latin typeface="Average"/>
+                  <a:ea typeface="Average"/>
+                  <a:cs typeface="Average"/>
+                  <a:sym typeface="Average"/>
+                </a:rPr>
+                <a:t>Actions</a:t>
+              </a:r>
+            </a:p>
+          </p:txBody>
+        </p:sp>
+        <p:sp>
+          <p:nvSpPr>
+            <p:cNvPr id="127" name="Shape 127"/>
+            <p:cNvSpPr/>
+            <p:nvPr/>
+          </p:nvSpPr>
+          <p:spPr>
+            <a:xfrm>
+              <a:off x="2494075" y="2727100"/>
+              <a:ext cx="1467000" cy="638700"/>
+            </a:xfrm>
+            <a:prstGeom prst="roundRect">
+              <a:avLst>
+                <a:gd name="adj" fmla="val 16667"/>
+              </a:avLst>
+            </a:prstGeom>
+            <a:solidFill>
+              <a:srgbClr val="FFFFFF"/>
+            </a:solidFill>
+            <a:ln>
+              <a:noFill/>
+            </a:ln>
+          </p:spPr>
+          <p:txBody>
+            <a:bodyPr lIns="91425" tIns="91425" rIns="91425" bIns="91425" anchor="ctr" anchorCtr="0">
+              <a:noAutofit/>
+            </a:bodyPr>
+            <a:lstStyle/>
+            <a:p>
+              <a:pPr lvl="0" algn="ctr" rtl="0">
+                <a:spcBef>
+                  <a:spcPts val="0"/>
+                </a:spcBef>
+                <a:buNone/>
+              </a:pPr>
+              <a:r>
+                <a:rPr lang="en-GB" sz="1800" b="1">
+                  <a:latin typeface="Average"/>
+                  <a:ea typeface="Average"/>
+                  <a:cs typeface="Average"/>
+                  <a:sym typeface="Average"/>
+                </a:rPr>
+                <a:t>Reducers</a:t>
+              </a:r>
+            </a:p>
+          </p:txBody>
+        </p:sp>
+        <p:sp>
+          <p:nvSpPr>
+            <p:cNvPr id="128" name="Shape 128"/>
+            <p:cNvSpPr/>
+            <p:nvPr/>
+          </p:nvSpPr>
+          <p:spPr>
+            <a:xfrm>
+              <a:off x="4427200" y="2727100"/>
+              <a:ext cx="1467000" cy="638700"/>
+            </a:xfrm>
+            <a:prstGeom prst="roundRect">
+              <a:avLst>
+                <a:gd name="adj" fmla="val 16667"/>
+              </a:avLst>
+            </a:prstGeom>
+            <a:solidFill>
+              <a:srgbClr val="FFFFFF"/>
+            </a:solidFill>
+            <a:ln>
+              <a:noFill/>
+            </a:ln>
+          </p:spPr>
+          <p:txBody>
+            <a:bodyPr lIns="91425" tIns="91425" rIns="91425" bIns="91425" anchor="ctr" anchorCtr="0">
+              <a:noAutofit/>
+            </a:bodyPr>
+            <a:lstStyle/>
+            <a:p>
+              <a:pPr lvl="0" algn="ctr" rtl="0">
+                <a:spcBef>
+                  <a:spcPts val="0"/>
+                </a:spcBef>
+                <a:buNone/>
+              </a:pPr>
+              <a:r>
+                <a:rPr lang="en-GB" sz="1800" b="1">
+                  <a:latin typeface="Average"/>
+                  <a:ea typeface="Average"/>
+                  <a:cs typeface="Average"/>
+                  <a:sym typeface="Average"/>
+                </a:rPr>
+                <a:t>Store</a:t>
+              </a:r>
+            </a:p>
+          </p:txBody>
+        </p:sp>
+        <p:sp>
+          <p:nvSpPr>
+            <p:cNvPr id="129" name="Shape 129"/>
+            <p:cNvSpPr/>
+            <p:nvPr/>
+          </p:nvSpPr>
+          <p:spPr>
+            <a:xfrm>
+              <a:off x="6360325" y="2727100"/>
+              <a:ext cx="1467000" cy="638700"/>
+            </a:xfrm>
+            <a:prstGeom prst="roundRect">
+              <a:avLst>
+                <a:gd name="adj" fmla="val 16667"/>
+              </a:avLst>
+            </a:prstGeom>
+            <a:solidFill>
+              <a:srgbClr val="FFFFFF"/>
+            </a:solidFill>
+            <a:ln>
+              <a:noFill/>
+            </a:ln>
+          </p:spPr>
+          <p:txBody>
+            <a:bodyPr lIns="91425" tIns="91425" rIns="91425" bIns="91425" anchor="ctr" anchorCtr="0">
+              <a:noAutofit/>
+            </a:bodyPr>
+            <a:lstStyle/>
+            <a:p>
+              <a:pPr lvl="0" algn="ctr" rtl="0">
+                <a:spcBef>
+                  <a:spcPts val="0"/>
+                </a:spcBef>
+                <a:buNone/>
+              </a:pPr>
+              <a:r>
+                <a:rPr lang="en-GB" sz="1800" b="1">
+                  <a:latin typeface="Average"/>
+                  <a:ea typeface="Average"/>
+                  <a:cs typeface="Average"/>
+                  <a:sym typeface="Average"/>
+                </a:rPr>
+                <a:t>Views (React)</a:t>
+              </a:r>
+            </a:p>
+          </p:txBody>
+        </p:sp>
+        <p:sp>
+          <p:nvSpPr>
+            <p:cNvPr id="130" name="Shape 130"/>
+            <p:cNvSpPr/>
+            <p:nvPr/>
+          </p:nvSpPr>
+          <p:spPr>
+            <a:xfrm>
+              <a:off x="2494075" y="1605200"/>
+              <a:ext cx="1467000" cy="638700"/>
+            </a:xfrm>
+            <a:prstGeom prst="roundRect">
+              <a:avLst>
+                <a:gd name="adj" fmla="val 16667"/>
+              </a:avLst>
+            </a:prstGeom>
+            <a:solidFill>
+              <a:srgbClr val="FFFFFF"/>
+            </a:solidFill>
+            <a:ln>
+              <a:noFill/>
+            </a:ln>
+          </p:spPr>
+          <p:txBody>
+            <a:bodyPr lIns="91425" tIns="91425" rIns="91425" bIns="91425" anchor="ctr" anchorCtr="0">
+              <a:noAutofit/>
+            </a:bodyPr>
+            <a:lstStyle/>
+            <a:p>
+              <a:pPr lvl="0" algn="ctr" rtl="0">
+                <a:spcBef>
+                  <a:spcPts val="0"/>
+                </a:spcBef>
+                <a:buNone/>
+              </a:pPr>
+              <a:r>
+                <a:rPr lang="en-GB" sz="1800" b="1">
+                  <a:latin typeface="Average"/>
+                  <a:ea typeface="Average"/>
+                  <a:cs typeface="Average"/>
+                  <a:sym typeface="Average"/>
+                </a:rPr>
+                <a:t>Actions</a:t>
+              </a:r>
+            </a:p>
+          </p:txBody>
+        </p:sp>
+        <p:cxnSp>
+          <p:nvCxnSpPr>
+            <p:cNvPr id="131" name="Shape 131"/>
+            <p:cNvCxnSpPr>
+              <a:stCxn id="126" idx="3"/>
+              <a:endCxn id="127" idx="1"/>
+            </p:cNvCxnSpPr>
+            <p:nvPr/>
+          </p:nvCxnSpPr>
+          <p:spPr>
+            <a:xfrm>
+              <a:off x="2027950" y="3046450"/>
+              <a:ext cx="466200" cy="0"/>
+            </a:xfrm>
+            <a:prstGeom prst="straightConnector1">
+              <a:avLst/>
+            </a:prstGeom>
+            <a:noFill/>
+            <a:ln w="28575" cap="flat" cmpd="sng">
+              <a:solidFill>
+                <a:srgbClr val="CFE2F3"/>
+              </a:solidFill>
+              <a:prstDash val="solid"/>
+              <a:round/>
+              <a:headEnd type="none" w="lg" len="lg"/>
+              <a:tailEnd type="stealth" w="lg" len="lg"/>
+            </a:ln>
+          </p:spPr>
+        </p:cxnSp>
+        <p:cxnSp>
+          <p:nvCxnSpPr>
+            <p:cNvPr id="132" name="Shape 132"/>
+            <p:cNvCxnSpPr>
+              <a:stCxn id="127" idx="3"/>
+              <a:endCxn id="128" idx="1"/>
+            </p:cNvCxnSpPr>
+            <p:nvPr/>
+          </p:nvCxnSpPr>
+          <p:spPr>
+            <a:xfrm>
+              <a:off x="3961075" y="3046450"/>
+              <a:ext cx="466200" cy="0"/>
+            </a:xfrm>
+            <a:prstGeom prst="straightConnector1">
+              <a:avLst/>
+            </a:prstGeom>
+            <a:noFill/>
+            <a:ln w="28575" cap="flat" cmpd="sng">
+              <a:solidFill>
+                <a:srgbClr val="CFE2F3"/>
+              </a:solidFill>
+              <a:prstDash val="solid"/>
+              <a:round/>
+              <a:headEnd type="none" w="lg" len="lg"/>
+              <a:tailEnd type="stealth" w="lg" len="lg"/>
+            </a:ln>
+          </p:spPr>
+        </p:cxnSp>
+        <p:cxnSp>
+          <p:nvCxnSpPr>
+            <p:cNvPr id="133" name="Shape 133"/>
+            <p:cNvCxnSpPr>
+              <a:stCxn id="128" idx="3"/>
+              <a:endCxn id="129" idx="1"/>
+            </p:cNvCxnSpPr>
+            <p:nvPr/>
+          </p:nvCxnSpPr>
+          <p:spPr>
+            <a:xfrm>
+              <a:off x="5894200" y="3046450"/>
+              <a:ext cx="466200" cy="0"/>
+            </a:xfrm>
+            <a:prstGeom prst="straightConnector1">
+              <a:avLst/>
+            </a:prstGeom>
+            <a:noFill/>
+            <a:ln w="28575" cap="flat" cmpd="sng">
+              <a:solidFill>
+                <a:srgbClr val="CFE2F3"/>
+              </a:solidFill>
+              <a:prstDash val="solid"/>
+              <a:round/>
+              <a:headEnd type="none" w="lg" len="lg"/>
+              <a:tailEnd type="stealth" w="lg" len="lg"/>
+            </a:ln>
+          </p:spPr>
+        </p:cxnSp>
+        <p:cxnSp>
+          <p:nvCxnSpPr>
+            <p:cNvPr id="134" name="Shape 134"/>
+            <p:cNvCxnSpPr>
+              <a:stCxn id="130" idx="2"/>
+              <a:endCxn id="127" idx="0"/>
+            </p:cNvCxnSpPr>
+            <p:nvPr/>
+          </p:nvCxnSpPr>
+          <p:spPr>
+            <a:xfrm>
+              <a:off x="3227575" y="2243900"/>
+              <a:ext cx="0" cy="483300"/>
+            </a:xfrm>
+            <a:prstGeom prst="straightConnector1">
+              <a:avLst/>
+            </a:prstGeom>
+            <a:noFill/>
+            <a:ln w="28575" cap="flat" cmpd="sng">
+              <a:solidFill>
+                <a:srgbClr val="CFE2F3"/>
+              </a:solidFill>
+              <a:prstDash val="solid"/>
+              <a:round/>
+              <a:headEnd type="none" w="lg" len="lg"/>
+              <a:tailEnd type="stealth" w="lg" len="lg"/>
+            </a:ln>
+          </p:spPr>
+        </p:cxnSp>
+        <p:cxnSp>
+          <p:nvCxnSpPr>
+            <p:cNvPr id="135" name="Shape 135"/>
+            <p:cNvCxnSpPr>
+              <a:stCxn id="129" idx="0"/>
+              <a:endCxn id="130" idx="3"/>
+            </p:cNvCxnSpPr>
+            <p:nvPr/>
+          </p:nvCxnSpPr>
+          <p:spPr>
+            <a:xfrm rot="10800000">
+              <a:off x="3960925" y="1924600"/>
+              <a:ext cx="3132900" cy="802500"/>
+            </a:xfrm>
+            <a:prstGeom prst="straightConnector1">
+              <a:avLst/>
+            </a:prstGeom>
+            <a:noFill/>
+            <a:ln w="28575" cap="flat" cmpd="sng">
+              <a:solidFill>
+                <a:srgbClr val="CFE2F3"/>
+              </a:solidFill>
+              <a:prstDash val="solid"/>
+              <a:round/>
+              <a:headEnd type="none" w="lg" len="lg"/>
+              <a:tailEnd type="stealth" w="lg" len="lg"/>
+            </a:ln>
+          </p:spPr>
+        </p:cxnSp>
+      </p:grpSp>
+    </p:spTree>
+    <p:extLst>
+      <p:ext uri="{BB962C8B-B14F-4D97-AF65-F5344CB8AC3E}">
+        <p14:creationId xmlns:p14="http://schemas.microsoft.com/office/powerpoint/2010/main" val="410060128"/>
+      </p:ext>
+    </p:extLst>
+  </p:cSld>
+  <p:clrMapOvr>
+    <a:masterClrMapping/>
+  </p:clrMapOvr>
+  <mc:AlternateContent xmlns:mc="http://schemas.openxmlformats.org/markup-compatibility/2006">
+    <mc:Choice xmlns:p14="http://schemas.microsoft.com/office/powerpoint/2010/main" Requires="p14">
+      <p:transition spd="med" p14:dur="700">
+        <p:fade/>
+      </p:transition>
+    </mc:Choice>
+    <mc:Fallback>
+      <p:transition xmlns:p14="http://schemas.microsoft.com/office/powerpoint/2010/main" spd="med">
+        <p:fade/>
+      </p:transition>
+    </mc:Fallback>
+  </mc:AlternateContent>
+  <p:timing>
+    <p:tnLst>
+      <p:par>
+        <p:cTn xmlns:p14="http://schemas.microsoft.com/office/powerpoint/2010/main" id="1" dur="indefinite" restart="never" nodeType="tmRoot"/>
+      </p:par>
+    </p:tnLst>
+  </p:timing>
+</p:sld>
+</file>
+
+<file path=ppt/slides/slide12.xml><?xml version="1.0" encoding="utf-8"?>
+<p:sld xmlns:a="http://schemas.openxmlformats.org/drawingml/2006/main" xmlns:r="http://schemas.openxmlformats.org/officeDocument/2006/relationships" xmlns:p="http://schemas.openxmlformats.org/presentationml/2006/main">
+  <p:cSld>
+    <p:spTree>
+      <p:nvGrpSpPr>
+        <p:cNvPr id="1" name="Shape 123"/>
+        <p:cNvGrpSpPr/>
+        <p:nvPr/>
+      </p:nvGrpSpPr>
+      <p:grpSpPr>
+        <a:xfrm>
+          <a:off x="0" y="0"/>
+          <a:ext cx="0" cy="0"/>
+          <a:chOff x="0" y="0"/>
+          <a:chExt cx="0" cy="0"/>
+        </a:xfrm>
+      </p:grpSpPr>
       <p:sp>
         <p:nvSpPr>
-          <p:cNvPr id="146" name="Shape 146"/>
+          <p:cNvPr id="124" name="Shape 124"/>
           <p:cNvSpPr txBox="1">
             <a:spLocks noGrp="1"/>
           </p:cNvSpPr>
           <p:nvPr>
-            <p:ph type="body" idx="1"/>
+            <p:ph type="title"/>
           </p:nvPr>
         </p:nvSpPr>
         <p:spPr>
           <a:xfrm>
-            <a:off x="311700" y="1152475"/>
-            <a:ext cx="8520600" cy="3416400"/>
+            <a:off x="311700" y="445025"/>
+            <a:ext cx="8520600" cy="572700"/>
           </a:xfrm>
           <a:prstGeom prst="rect">
             <a:avLst/>
@@ -6844,297 +7026,513 @@
           </a:bodyPr>
           <a:lstStyle/>
           <a:p>
-            <a:pPr marL="457200" lvl="0" indent="-228600" rtl="0">
-              <a:lnSpc>
-                <a:spcPct val="100000"/>
-              </a:lnSpc>
-              <a:spcBef>
-                <a:spcPts val="0"/>
-              </a:spcBef>
-              <a:spcAft>
-                <a:spcPts val="400"/>
-              </a:spcAft>
-              <a:buClr>
-                <a:srgbClr val="999999"/>
-              </a:buClr>
-              <a:buAutoNum type="arabicPeriod"/>
+            <a:pPr lvl="0">
+              <a:spcBef>
+                <a:spcPts val="0"/>
+              </a:spcBef>
+              <a:buNone/>
             </a:pPr>
             <a:r>
-              <a:rPr lang="en-GB" dirty="0">
-                <a:solidFill>
-                  <a:srgbClr val="999999"/>
-                </a:solidFill>
-              </a:rPr>
-              <a:t>Single-Page apps</a:t>
-            </a:r>
-          </a:p>
-          <a:p>
-            <a:pPr marL="457200" lvl="0" indent="-228600" rtl="0">
-              <a:lnSpc>
-                <a:spcPct val="100000"/>
-              </a:lnSpc>
-              <a:spcBef>
-                <a:spcPts val="0"/>
-              </a:spcBef>
-              <a:spcAft>
-                <a:spcPts val="400"/>
-              </a:spcAft>
-              <a:buClr>
-                <a:srgbClr val="999999"/>
-              </a:buClr>
-              <a:buAutoNum type="arabicPeriod"/>
-            </a:pPr>
-            <a:r>
-              <a:rPr lang="en-GB" dirty="0">
-                <a:solidFill>
-                  <a:srgbClr val="999999"/>
-                </a:solidFill>
-              </a:rPr>
-              <a:t>The React ecosystem + Flux architectural pattern</a:t>
-            </a:r>
-          </a:p>
-          <a:p>
-            <a:pPr marL="457200" lvl="0" indent="-228600" rtl="0">
-              <a:lnSpc>
-                <a:spcPct val="100000"/>
-              </a:lnSpc>
-              <a:spcBef>
-                <a:spcPts val="0"/>
-              </a:spcBef>
-              <a:spcAft>
-                <a:spcPts val="400"/>
-              </a:spcAft>
-              <a:buClr>
-                <a:srgbClr val="999999"/>
-              </a:buClr>
-              <a:buAutoNum type="arabicPeriod"/>
-            </a:pPr>
-            <a:r>
-              <a:rPr lang="en-GB" dirty="0">
-                <a:solidFill>
-                  <a:srgbClr val="999999"/>
-                </a:solidFill>
-              </a:rPr>
-              <a:t>Redux vs. Flux</a:t>
-            </a:r>
-          </a:p>
-          <a:p>
-            <a:pPr marL="457200" lvl="0" indent="-228600" rtl="0">
-              <a:lnSpc>
-                <a:spcPct val="100000"/>
-              </a:lnSpc>
-              <a:spcBef>
-                <a:spcPts val="0"/>
-              </a:spcBef>
-              <a:spcAft>
-                <a:spcPts val="400"/>
-              </a:spcAft>
-              <a:buClr>
-                <a:srgbClr val="999999"/>
-              </a:buClr>
-              <a:buAutoNum type="arabicPeriod"/>
-            </a:pPr>
-            <a:r>
-              <a:rPr lang="en-GB" dirty="0">
-                <a:solidFill>
-                  <a:srgbClr val="999999"/>
-                </a:solidFill>
-              </a:rPr>
-              <a:t>Questions</a:t>
-            </a:r>
-          </a:p>
-          <a:p>
-            <a:pPr marL="457200" lvl="0" indent="-228600" rtl="0">
-              <a:lnSpc>
-                <a:spcPct val="100000"/>
-              </a:lnSpc>
-              <a:spcBef>
-                <a:spcPts val="0"/>
-              </a:spcBef>
-              <a:spcAft>
-                <a:spcPts val="400"/>
-              </a:spcAft>
-              <a:buClr>
-                <a:srgbClr val="B7B7B7"/>
-              </a:buClr>
-              <a:buAutoNum type="arabicPeriod"/>
-            </a:pPr>
-            <a:r>
-              <a:rPr lang="en-GB" dirty="0">
-                <a:solidFill>
-                  <a:srgbClr val="B7B7B7"/>
-                </a:solidFill>
-              </a:rPr>
-              <a:t>Break</a:t>
-            </a:r>
-          </a:p>
-          <a:p>
-            <a:pPr marL="457200" lvl="0" indent="-228600" rtl="0">
-              <a:lnSpc>
-                <a:spcPct val="100000"/>
-              </a:lnSpc>
-              <a:spcBef>
-                <a:spcPts val="0"/>
-              </a:spcBef>
-              <a:spcAft>
-                <a:spcPts val="400"/>
-              </a:spcAft>
-              <a:buClr>
-                <a:srgbClr val="FFFFFF"/>
-              </a:buClr>
-              <a:buAutoNum type="arabicPeriod"/>
-            </a:pPr>
-            <a:r>
-              <a:rPr lang="en-GB" dirty="0">
-                <a:solidFill>
-                  <a:srgbClr val="FFFFFF"/>
-                </a:solidFill>
-              </a:rPr>
-              <a:t>Pure functions</a:t>
-            </a:r>
-          </a:p>
-          <a:p>
-            <a:pPr marL="457200" lvl="0" indent="-228600" rtl="0">
-              <a:lnSpc>
-                <a:spcPct val="100000"/>
-              </a:lnSpc>
-              <a:spcBef>
-                <a:spcPts val="0"/>
-              </a:spcBef>
-              <a:spcAft>
-                <a:spcPts val="400"/>
-              </a:spcAft>
-              <a:buClr>
-                <a:srgbClr val="FFFFFF"/>
-              </a:buClr>
-              <a:buAutoNum type="arabicPeriod"/>
-            </a:pPr>
-            <a:r>
-              <a:rPr lang="en-GB" dirty="0">
-                <a:solidFill>
-                  <a:srgbClr val="FFFFFF"/>
-                </a:solidFill>
-              </a:rPr>
-              <a:t>Redux - Reducers and Actions</a:t>
-            </a:r>
-          </a:p>
-          <a:p>
-            <a:pPr marL="457200" lvl="0" indent="-228600" rtl="0">
-              <a:lnSpc>
-                <a:spcPct val="100000"/>
-              </a:lnSpc>
-              <a:spcBef>
-                <a:spcPts val="0"/>
-              </a:spcBef>
-              <a:spcAft>
-                <a:spcPts val="400"/>
-              </a:spcAft>
-              <a:buClr>
-                <a:srgbClr val="FFFFFF"/>
-              </a:buClr>
-              <a:buAutoNum type="arabicPeriod"/>
-            </a:pPr>
-            <a:r>
-              <a:rPr lang="en-GB" dirty="0">
-                <a:solidFill>
-                  <a:srgbClr val="FFFFFF"/>
-                </a:solidFill>
-              </a:rPr>
-              <a:t>Let’s build something tiny in React and Redux</a:t>
-            </a:r>
-          </a:p>
-          <a:p>
-            <a:pPr marL="457200" lvl="0" indent="-228600" rtl="0">
-              <a:lnSpc>
-                <a:spcPct val="100000"/>
-              </a:lnSpc>
-              <a:spcBef>
-                <a:spcPts val="0"/>
-              </a:spcBef>
-              <a:spcAft>
-                <a:spcPts val="400"/>
-              </a:spcAft>
-              <a:buClr>
-                <a:schemeClr val="accent5"/>
-              </a:buClr>
-              <a:buAutoNum type="arabicPeriod"/>
-            </a:pPr>
-            <a:r>
-              <a:rPr lang="en-GB" dirty="0">
-                <a:solidFill>
-                  <a:schemeClr val="accent5"/>
-                </a:solidFill>
-              </a:rPr>
-              <a:t>(Time permitting) </a:t>
-            </a:r>
-            <a:r>
-              <a:rPr lang="en-GB" dirty="0" err="1">
-                <a:solidFill>
-                  <a:schemeClr val="accent5"/>
-                </a:solidFill>
-              </a:rPr>
-              <a:t>Webpack</a:t>
-            </a:r>
-            <a:r>
-              <a:rPr lang="en-GB" dirty="0">
-                <a:solidFill>
-                  <a:schemeClr val="accent5"/>
-                </a:solidFill>
-              </a:rPr>
-              <a:t> + Babel // CSS + </a:t>
-            </a:r>
-            <a:r>
-              <a:rPr lang="en-GB" dirty="0" err="1">
-                <a:solidFill>
-                  <a:schemeClr val="accent5"/>
-                </a:solidFill>
-              </a:rPr>
-              <a:t>Webpack</a:t>
-            </a:r>
-            <a:r>
-              <a:rPr lang="en-GB" dirty="0">
-                <a:solidFill>
-                  <a:schemeClr val="accent5"/>
-                </a:solidFill>
-              </a:rPr>
-              <a:t> + React</a:t>
-            </a:r>
-          </a:p>
-          <a:p>
-            <a:pPr marL="457200" lvl="0" indent="-228600" rtl="0">
-              <a:lnSpc>
-                <a:spcPct val="100000"/>
-              </a:lnSpc>
-              <a:spcBef>
-                <a:spcPts val="0"/>
-              </a:spcBef>
-              <a:spcAft>
-                <a:spcPts val="400"/>
-              </a:spcAft>
-              <a:buClr>
-                <a:schemeClr val="accent5"/>
-              </a:buClr>
-              <a:buAutoNum type="arabicPeriod"/>
-            </a:pPr>
-            <a:r>
-              <a:rPr lang="en-GB" dirty="0">
-                <a:solidFill>
-                  <a:schemeClr val="accent5"/>
-                </a:solidFill>
-              </a:rPr>
-              <a:t>AMA</a:t>
-            </a:r>
+              <a:rPr lang="en-GB"/>
+              <a:t>Redux, and why it’s better (in my opinion…)</a:t>
+            </a:r>
+          </a:p>
+        </p:txBody>
+      </p:sp>
+      <p:grpSp>
+        <p:nvGrpSpPr>
+          <p:cNvPr id="125" name="Shape 125"/>
+          <p:cNvGrpSpPr/>
+          <p:nvPr/>
+        </p:nvGrpSpPr>
+        <p:grpSpPr>
+          <a:xfrm>
+            <a:off x="938812" y="1605200"/>
+            <a:ext cx="7266375" cy="1760600"/>
+            <a:chOff x="560950" y="1605200"/>
+            <a:chExt cx="7266375" cy="1760600"/>
+          </a:xfrm>
+        </p:grpSpPr>
+        <p:sp>
+          <p:nvSpPr>
+            <p:cNvPr id="126" name="Shape 126"/>
+            <p:cNvSpPr/>
+            <p:nvPr/>
+          </p:nvSpPr>
+          <p:spPr>
+            <a:xfrm>
+              <a:off x="560950" y="2727100"/>
+              <a:ext cx="1467000" cy="638700"/>
+            </a:xfrm>
+            <a:prstGeom prst="roundRect">
+              <a:avLst>
+                <a:gd name="adj" fmla="val 16667"/>
+              </a:avLst>
+            </a:prstGeom>
+            <a:solidFill>
+              <a:srgbClr val="FFFFFF"/>
+            </a:solidFill>
+            <a:ln>
+              <a:noFill/>
+            </a:ln>
+          </p:spPr>
+          <p:txBody>
+            <a:bodyPr lIns="91425" tIns="91425" rIns="91425" bIns="91425" anchor="ctr" anchorCtr="0">
+              <a:noAutofit/>
+            </a:bodyPr>
+            <a:lstStyle/>
+            <a:p>
+              <a:pPr lvl="0" algn="ctr" rtl="0">
+                <a:spcBef>
+                  <a:spcPts val="0"/>
+                </a:spcBef>
+                <a:buNone/>
+              </a:pPr>
+              <a:r>
+                <a:rPr lang="en-GB" sz="1800" b="1">
+                  <a:latin typeface="Average"/>
+                  <a:ea typeface="Average"/>
+                  <a:cs typeface="Average"/>
+                  <a:sym typeface="Average"/>
+                </a:rPr>
+                <a:t>Actions</a:t>
+              </a:r>
+            </a:p>
+          </p:txBody>
+        </p:sp>
+        <p:sp>
+          <p:nvSpPr>
+            <p:cNvPr id="127" name="Shape 127"/>
+            <p:cNvSpPr/>
+            <p:nvPr/>
+          </p:nvSpPr>
+          <p:spPr>
+            <a:xfrm>
+              <a:off x="2494075" y="2727100"/>
+              <a:ext cx="1467000" cy="638700"/>
+            </a:xfrm>
+            <a:prstGeom prst="roundRect">
+              <a:avLst>
+                <a:gd name="adj" fmla="val 16667"/>
+              </a:avLst>
+            </a:prstGeom>
+            <a:solidFill>
+              <a:srgbClr val="FFFFFF"/>
+            </a:solidFill>
+            <a:ln>
+              <a:noFill/>
+            </a:ln>
+          </p:spPr>
+          <p:txBody>
+            <a:bodyPr lIns="91425" tIns="91425" rIns="91425" bIns="91425" anchor="ctr" anchorCtr="0">
+              <a:noAutofit/>
+            </a:bodyPr>
+            <a:lstStyle/>
+            <a:p>
+              <a:pPr lvl="0" algn="ctr" rtl="0">
+                <a:spcBef>
+                  <a:spcPts val="0"/>
+                </a:spcBef>
+                <a:buNone/>
+              </a:pPr>
+              <a:r>
+                <a:rPr lang="en-GB" sz="1800" b="1">
+                  <a:latin typeface="Average"/>
+                  <a:ea typeface="Average"/>
+                  <a:cs typeface="Average"/>
+                  <a:sym typeface="Average"/>
+                </a:rPr>
+                <a:t>Reducers</a:t>
+              </a:r>
+            </a:p>
+          </p:txBody>
+        </p:sp>
+        <p:sp>
+          <p:nvSpPr>
+            <p:cNvPr id="128" name="Shape 128"/>
+            <p:cNvSpPr/>
+            <p:nvPr/>
+          </p:nvSpPr>
+          <p:spPr>
+            <a:xfrm>
+              <a:off x="4427200" y="2727100"/>
+              <a:ext cx="1467000" cy="638700"/>
+            </a:xfrm>
+            <a:prstGeom prst="roundRect">
+              <a:avLst>
+                <a:gd name="adj" fmla="val 16667"/>
+              </a:avLst>
+            </a:prstGeom>
+            <a:solidFill>
+              <a:srgbClr val="FFFFFF"/>
+            </a:solidFill>
+            <a:ln>
+              <a:noFill/>
+            </a:ln>
+          </p:spPr>
+          <p:txBody>
+            <a:bodyPr lIns="91425" tIns="91425" rIns="91425" bIns="91425" anchor="ctr" anchorCtr="0">
+              <a:noAutofit/>
+            </a:bodyPr>
+            <a:lstStyle/>
+            <a:p>
+              <a:pPr lvl="0" algn="ctr" rtl="0">
+                <a:spcBef>
+                  <a:spcPts val="0"/>
+                </a:spcBef>
+                <a:buNone/>
+              </a:pPr>
+              <a:r>
+                <a:rPr lang="en-GB" sz="1800" b="1">
+                  <a:latin typeface="Average"/>
+                  <a:ea typeface="Average"/>
+                  <a:cs typeface="Average"/>
+                  <a:sym typeface="Average"/>
+                </a:rPr>
+                <a:t>Store</a:t>
+              </a:r>
+            </a:p>
+          </p:txBody>
+        </p:sp>
+        <p:sp>
+          <p:nvSpPr>
+            <p:cNvPr id="129" name="Shape 129"/>
+            <p:cNvSpPr/>
+            <p:nvPr/>
+          </p:nvSpPr>
+          <p:spPr>
+            <a:xfrm>
+              <a:off x="6360325" y="2727100"/>
+              <a:ext cx="1467000" cy="638700"/>
+            </a:xfrm>
+            <a:prstGeom prst="roundRect">
+              <a:avLst>
+                <a:gd name="adj" fmla="val 16667"/>
+              </a:avLst>
+            </a:prstGeom>
+            <a:solidFill>
+              <a:srgbClr val="FFFFFF"/>
+            </a:solidFill>
+            <a:ln>
+              <a:noFill/>
+            </a:ln>
+          </p:spPr>
+          <p:txBody>
+            <a:bodyPr lIns="91425" tIns="91425" rIns="91425" bIns="91425" anchor="ctr" anchorCtr="0">
+              <a:noAutofit/>
+            </a:bodyPr>
+            <a:lstStyle/>
+            <a:p>
+              <a:pPr lvl="0" algn="ctr" rtl="0">
+                <a:spcBef>
+                  <a:spcPts val="0"/>
+                </a:spcBef>
+                <a:buNone/>
+              </a:pPr>
+              <a:r>
+                <a:rPr lang="en-GB" sz="1800" b="1">
+                  <a:latin typeface="Average"/>
+                  <a:ea typeface="Average"/>
+                  <a:cs typeface="Average"/>
+                  <a:sym typeface="Average"/>
+                </a:rPr>
+                <a:t>Views (React)</a:t>
+              </a:r>
+            </a:p>
+          </p:txBody>
+        </p:sp>
+        <p:sp>
+          <p:nvSpPr>
+            <p:cNvPr id="130" name="Shape 130"/>
+            <p:cNvSpPr/>
+            <p:nvPr/>
+          </p:nvSpPr>
+          <p:spPr>
+            <a:xfrm>
+              <a:off x="2494075" y="1605200"/>
+              <a:ext cx="1467000" cy="638700"/>
+            </a:xfrm>
+            <a:prstGeom prst="roundRect">
+              <a:avLst>
+                <a:gd name="adj" fmla="val 16667"/>
+              </a:avLst>
+            </a:prstGeom>
+            <a:solidFill>
+              <a:srgbClr val="FFFFFF"/>
+            </a:solidFill>
+            <a:ln>
+              <a:noFill/>
+            </a:ln>
+          </p:spPr>
+          <p:txBody>
+            <a:bodyPr lIns="91425" tIns="91425" rIns="91425" bIns="91425" anchor="ctr" anchorCtr="0">
+              <a:noAutofit/>
+            </a:bodyPr>
+            <a:lstStyle/>
+            <a:p>
+              <a:pPr lvl="0" algn="ctr" rtl="0">
+                <a:spcBef>
+                  <a:spcPts val="0"/>
+                </a:spcBef>
+                <a:buNone/>
+              </a:pPr>
+              <a:r>
+                <a:rPr lang="en-GB" sz="1800" b="1">
+                  <a:latin typeface="Average"/>
+                  <a:ea typeface="Average"/>
+                  <a:cs typeface="Average"/>
+                  <a:sym typeface="Average"/>
+                </a:rPr>
+                <a:t>Actions</a:t>
+              </a:r>
+            </a:p>
+          </p:txBody>
+        </p:sp>
+        <p:cxnSp>
+          <p:nvCxnSpPr>
+            <p:cNvPr id="131" name="Shape 131"/>
+            <p:cNvCxnSpPr>
+              <a:stCxn id="126" idx="3"/>
+              <a:endCxn id="127" idx="1"/>
+            </p:cNvCxnSpPr>
+            <p:nvPr/>
+          </p:nvCxnSpPr>
+          <p:spPr>
+            <a:xfrm>
+              <a:off x="2027950" y="3046450"/>
+              <a:ext cx="466200" cy="0"/>
+            </a:xfrm>
+            <a:prstGeom prst="straightConnector1">
+              <a:avLst/>
+            </a:prstGeom>
+            <a:noFill/>
+            <a:ln w="28575" cap="flat" cmpd="sng">
+              <a:solidFill>
+                <a:srgbClr val="CFE2F3"/>
+              </a:solidFill>
+              <a:prstDash val="solid"/>
+              <a:round/>
+              <a:headEnd type="none" w="lg" len="lg"/>
+              <a:tailEnd type="stealth" w="lg" len="lg"/>
+            </a:ln>
+          </p:spPr>
+        </p:cxnSp>
+        <p:cxnSp>
+          <p:nvCxnSpPr>
+            <p:cNvPr id="132" name="Shape 132"/>
+            <p:cNvCxnSpPr>
+              <a:stCxn id="127" idx="3"/>
+              <a:endCxn id="128" idx="1"/>
+            </p:cNvCxnSpPr>
+            <p:nvPr/>
+          </p:nvCxnSpPr>
+          <p:spPr>
+            <a:xfrm>
+              <a:off x="3961075" y="3046450"/>
+              <a:ext cx="466200" cy="0"/>
+            </a:xfrm>
+            <a:prstGeom prst="straightConnector1">
+              <a:avLst/>
+            </a:prstGeom>
+            <a:noFill/>
+            <a:ln w="28575" cap="flat" cmpd="sng">
+              <a:solidFill>
+                <a:srgbClr val="CFE2F3"/>
+              </a:solidFill>
+              <a:prstDash val="solid"/>
+              <a:round/>
+              <a:headEnd type="none" w="lg" len="lg"/>
+              <a:tailEnd type="stealth" w="lg" len="lg"/>
+            </a:ln>
+          </p:spPr>
+        </p:cxnSp>
+        <p:cxnSp>
+          <p:nvCxnSpPr>
+            <p:cNvPr id="133" name="Shape 133"/>
+            <p:cNvCxnSpPr>
+              <a:stCxn id="128" idx="3"/>
+              <a:endCxn id="129" idx="1"/>
+            </p:cNvCxnSpPr>
+            <p:nvPr/>
+          </p:nvCxnSpPr>
+          <p:spPr>
+            <a:xfrm>
+              <a:off x="5894200" y="3046450"/>
+              <a:ext cx="466200" cy="0"/>
+            </a:xfrm>
+            <a:prstGeom prst="straightConnector1">
+              <a:avLst/>
+            </a:prstGeom>
+            <a:noFill/>
+            <a:ln w="28575" cap="flat" cmpd="sng">
+              <a:solidFill>
+                <a:srgbClr val="CFE2F3"/>
+              </a:solidFill>
+              <a:prstDash val="solid"/>
+              <a:round/>
+              <a:headEnd type="none" w="lg" len="lg"/>
+              <a:tailEnd type="stealth" w="lg" len="lg"/>
+            </a:ln>
+          </p:spPr>
+        </p:cxnSp>
+        <p:cxnSp>
+          <p:nvCxnSpPr>
+            <p:cNvPr id="134" name="Shape 134"/>
+            <p:cNvCxnSpPr>
+              <a:stCxn id="130" idx="2"/>
+              <a:endCxn id="127" idx="0"/>
+            </p:cNvCxnSpPr>
+            <p:nvPr/>
+          </p:nvCxnSpPr>
+          <p:spPr>
+            <a:xfrm>
+              <a:off x="3227575" y="2243900"/>
+              <a:ext cx="0" cy="483300"/>
+            </a:xfrm>
+            <a:prstGeom prst="straightConnector1">
+              <a:avLst/>
+            </a:prstGeom>
+            <a:noFill/>
+            <a:ln w="28575" cap="flat" cmpd="sng">
+              <a:solidFill>
+                <a:srgbClr val="CFE2F3"/>
+              </a:solidFill>
+              <a:prstDash val="solid"/>
+              <a:round/>
+              <a:headEnd type="none" w="lg" len="lg"/>
+              <a:tailEnd type="stealth" w="lg" len="lg"/>
+            </a:ln>
+          </p:spPr>
+        </p:cxnSp>
+        <p:cxnSp>
+          <p:nvCxnSpPr>
+            <p:cNvPr id="135" name="Shape 135"/>
+            <p:cNvCxnSpPr>
+              <a:stCxn id="129" idx="0"/>
+              <a:endCxn id="130" idx="3"/>
+            </p:cNvCxnSpPr>
+            <p:nvPr/>
+          </p:nvCxnSpPr>
+          <p:spPr>
+            <a:xfrm rot="10800000">
+              <a:off x="3960925" y="1924600"/>
+              <a:ext cx="3132900" cy="802500"/>
+            </a:xfrm>
+            <a:prstGeom prst="straightConnector1">
+              <a:avLst/>
+            </a:prstGeom>
+            <a:noFill/>
+            <a:ln w="28575" cap="flat" cmpd="sng">
+              <a:solidFill>
+                <a:srgbClr val="CFE2F3"/>
+              </a:solidFill>
+              <a:prstDash val="solid"/>
+              <a:round/>
+              <a:headEnd type="none" w="lg" len="lg"/>
+              <a:tailEnd type="stealth" w="lg" len="lg"/>
+            </a:ln>
+          </p:spPr>
+        </p:cxnSp>
+      </p:grpSp>
+      <p:pic>
+        <p:nvPicPr>
+          <p:cNvPr id="2" name="Picture 1"/>
+          <p:cNvPicPr>
+            <a:picLocks noChangeAspect="1"/>
+          </p:cNvPicPr>
+          <p:nvPr/>
+        </p:nvPicPr>
+        <p:blipFill>
+          <a:blip r:embed="rId3"/>
+          <a:stretch>
+            <a:fillRect/>
+          </a:stretch>
+        </p:blipFill>
+        <p:spPr>
+          <a:xfrm rot="645849">
+            <a:off x="3983672" y="2862087"/>
+            <a:ext cx="2727100" cy="2727100"/>
+          </a:xfrm>
+          <a:prstGeom prst="rect">
+            <a:avLst/>
+          </a:prstGeom>
+        </p:spPr>
+      </p:pic>
+      <p:sp>
+        <p:nvSpPr>
+          <p:cNvPr id="3" name="Oval Callout 2"/>
+          <p:cNvSpPr/>
+          <p:nvPr/>
+        </p:nvSpPr>
+        <p:spPr>
+          <a:xfrm>
+            <a:off x="1136759" y="3440227"/>
+            <a:ext cx="3028564" cy="1173163"/>
+          </a:xfrm>
+          <a:prstGeom prst="wedgeEllipseCallout">
+            <a:avLst>
+              <a:gd name="adj1" fmla="val 66232"/>
+              <a:gd name="adj2" fmla="val 26136"/>
+            </a:avLst>
+          </a:prstGeom>
+        </p:spPr>
+        <p:style>
+          <a:lnRef idx="1">
+            <a:schemeClr val="accent1"/>
+          </a:lnRef>
+          <a:fillRef idx="3">
+            <a:schemeClr val="accent1"/>
+          </a:fillRef>
+          <a:effectRef idx="2">
+            <a:schemeClr val="accent1"/>
+          </a:effectRef>
+          <a:fontRef idx="minor">
+            <a:schemeClr val="lt1"/>
+          </a:fontRef>
+        </p:style>
+        <p:txBody>
+          <a:bodyPr rtlCol="0" anchor="ctr"/>
+          <a:lstStyle/>
+          <a:p>
+            <a:pPr algn="ctr"/>
+            <a:r>
+              <a:rPr lang="en-US" dirty="0" smtClean="0"/>
+              <a:t>Take my </a:t>
+            </a:r>
+            <a:r>
+              <a:rPr lang="en-US" dirty="0" err="1" smtClean="0"/>
+              <a:t>Egghead.io</a:t>
+            </a:r>
+            <a:r>
+              <a:rPr lang="en-US" dirty="0" smtClean="0"/>
+              <a:t> course!!</a:t>
+            </a:r>
+            <a:endParaRPr lang="en-US" dirty="0"/>
           </a:p>
         </p:txBody>
       </p:sp>
     </p:spTree>
+    <p:extLst>
+      <p:ext uri="{BB962C8B-B14F-4D97-AF65-F5344CB8AC3E}">
+        <p14:creationId xmlns:p14="http://schemas.microsoft.com/office/powerpoint/2010/main" val="4232659710"/>
+      </p:ext>
+    </p:extLst>
   </p:cSld>
   <p:clrMapOvr>
     <a:masterClrMapping/>
   </p:clrMapOvr>
-  <p:transition xmlns:p14="http://schemas.microsoft.com/office/powerpoint/2010/main" spd="slow">
-    <p:cut/>
-  </p:transition>
+  <mc:AlternateContent xmlns:mc="http://schemas.openxmlformats.org/markup-compatibility/2006">
+    <mc:Choice xmlns:p14="http://schemas.microsoft.com/office/powerpoint/2010/main" Requires="p14">
+      <p:transition spd="med" p14:dur="700">
+        <p:fade/>
+      </p:transition>
+    </mc:Choice>
+    <mc:Fallback>
+      <p:transition xmlns:p14="http://schemas.microsoft.com/office/powerpoint/2010/main" spd="med">
+        <p:fade/>
+      </p:transition>
+    </mc:Fallback>
+  </mc:AlternateContent>
   <p:timing>
     <p:tnLst>
       <p:par>
@@ -7194,6 +7592,460 @@
               <a:buNone/>
             </a:pPr>
             <a:r>
+              <a:rPr lang="en-GB"/>
+              <a:t>First questions, then a 10-minute break...</a:t>
+            </a:r>
+          </a:p>
+        </p:txBody>
+      </p:sp>
+    </p:spTree>
+  </p:cSld>
+  <p:clrMapOvr>
+    <a:masterClrMapping/>
+  </p:clrMapOvr>
+  <p:transition xmlns:p14="http://schemas.microsoft.com/office/powerpoint/2010/main" spd="slow">
+    <p:cut/>
+  </p:transition>
+  <p:timing>
+    <p:tnLst>
+      <p:par>
+        <p:cTn xmlns:p14="http://schemas.microsoft.com/office/powerpoint/2010/main" id="1" dur="indefinite" restart="never" nodeType="tmRoot"/>
+      </p:par>
+    </p:tnLst>
+  </p:timing>
+</p:sld>
+</file>
+
+<file path=ppt/slides/slide14.xml><?xml version="1.0" encoding="utf-8"?>
+<p:sld xmlns:a="http://schemas.openxmlformats.org/drawingml/2006/main" xmlns:r="http://schemas.openxmlformats.org/officeDocument/2006/relationships" xmlns:p="http://schemas.openxmlformats.org/presentationml/2006/main">
+  <p:cSld>
+    <p:spTree>
+      <p:nvGrpSpPr>
+        <p:cNvPr id="1" name="Shape 144"/>
+        <p:cNvGrpSpPr/>
+        <p:nvPr/>
+      </p:nvGrpSpPr>
+      <p:grpSpPr>
+        <a:xfrm>
+          <a:off x="0" y="0"/>
+          <a:ext cx="0" cy="0"/>
+          <a:chOff x="0" y="0"/>
+          <a:chExt cx="0" cy="0"/>
+        </a:xfrm>
+      </p:grpSpPr>
+      <p:sp>
+        <p:nvSpPr>
+          <p:cNvPr id="145" name="Shape 145"/>
+          <p:cNvSpPr txBox="1">
+            <a:spLocks noGrp="1"/>
+          </p:cNvSpPr>
+          <p:nvPr>
+            <p:ph type="title"/>
+          </p:nvPr>
+        </p:nvSpPr>
+        <p:spPr>
+          <a:xfrm>
+            <a:off x="311700" y="445025"/>
+            <a:ext cx="8520600" cy="572700"/>
+          </a:xfrm>
+          <a:prstGeom prst="rect">
+            <a:avLst/>
+          </a:prstGeom>
+        </p:spPr>
+        <p:txBody>
+          <a:bodyPr lIns="91425" tIns="91425" rIns="91425" bIns="91425" anchor="t" anchorCtr="0">
+            <a:noAutofit/>
+          </a:bodyPr>
+          <a:lstStyle/>
+          <a:p>
+            <a:pPr lvl="0" rtl="0">
+              <a:spcBef>
+                <a:spcPts val="0"/>
+              </a:spcBef>
+              <a:buNone/>
+            </a:pPr>
+            <a:r>
+              <a:rPr lang="en-GB"/>
+              <a:t>Agenda</a:t>
+            </a:r>
+          </a:p>
+        </p:txBody>
+      </p:sp>
+      <p:sp>
+        <p:nvSpPr>
+          <p:cNvPr id="146" name="Shape 146"/>
+          <p:cNvSpPr txBox="1">
+            <a:spLocks noGrp="1"/>
+          </p:cNvSpPr>
+          <p:nvPr>
+            <p:ph type="body" idx="1"/>
+          </p:nvPr>
+        </p:nvSpPr>
+        <p:spPr>
+          <a:xfrm>
+            <a:off x="311700" y="1152475"/>
+            <a:ext cx="8520600" cy="3416400"/>
+          </a:xfrm>
+          <a:prstGeom prst="rect">
+            <a:avLst/>
+          </a:prstGeom>
+        </p:spPr>
+        <p:txBody>
+          <a:bodyPr lIns="91425" tIns="91425" rIns="91425" bIns="91425" anchor="t" anchorCtr="0">
+            <a:noAutofit/>
+          </a:bodyPr>
+          <a:lstStyle/>
+          <a:p>
+            <a:pPr marL="457200" lvl="0" indent="-228600" rtl="0">
+              <a:lnSpc>
+                <a:spcPct val="100000"/>
+              </a:lnSpc>
+              <a:spcBef>
+                <a:spcPts val="0"/>
+              </a:spcBef>
+              <a:spcAft>
+                <a:spcPts val="400"/>
+              </a:spcAft>
+              <a:buClr>
+                <a:srgbClr val="999999"/>
+              </a:buClr>
+              <a:buAutoNum type="arabicPeriod"/>
+            </a:pPr>
+            <a:r>
+              <a:rPr lang="en-GB" dirty="0">
+                <a:solidFill>
+                  <a:srgbClr val="999999"/>
+                </a:solidFill>
+              </a:rPr>
+              <a:t>Single-Page apps</a:t>
+            </a:r>
+          </a:p>
+          <a:p>
+            <a:pPr marL="457200" lvl="0" indent="-228600" rtl="0">
+              <a:lnSpc>
+                <a:spcPct val="100000"/>
+              </a:lnSpc>
+              <a:spcBef>
+                <a:spcPts val="0"/>
+              </a:spcBef>
+              <a:spcAft>
+                <a:spcPts val="400"/>
+              </a:spcAft>
+              <a:buClr>
+                <a:srgbClr val="999999"/>
+              </a:buClr>
+              <a:buAutoNum type="arabicPeriod"/>
+            </a:pPr>
+            <a:r>
+              <a:rPr lang="en-GB" dirty="0">
+                <a:solidFill>
+                  <a:srgbClr val="999999"/>
+                </a:solidFill>
+              </a:rPr>
+              <a:t>The React ecosystem + Flux architectural pattern</a:t>
+            </a:r>
+          </a:p>
+          <a:p>
+            <a:pPr marL="457200" lvl="0" indent="-228600" rtl="0">
+              <a:lnSpc>
+                <a:spcPct val="100000"/>
+              </a:lnSpc>
+              <a:spcBef>
+                <a:spcPts val="0"/>
+              </a:spcBef>
+              <a:spcAft>
+                <a:spcPts val="400"/>
+              </a:spcAft>
+              <a:buClr>
+                <a:srgbClr val="999999"/>
+              </a:buClr>
+              <a:buAutoNum type="arabicPeriod"/>
+            </a:pPr>
+            <a:r>
+              <a:rPr lang="en-GB" dirty="0">
+                <a:solidFill>
+                  <a:srgbClr val="999999"/>
+                </a:solidFill>
+              </a:rPr>
+              <a:t>Redux vs. Flux</a:t>
+            </a:r>
+          </a:p>
+          <a:p>
+            <a:pPr marL="457200" lvl="0" indent="-228600" rtl="0">
+              <a:lnSpc>
+                <a:spcPct val="100000"/>
+              </a:lnSpc>
+              <a:spcBef>
+                <a:spcPts val="0"/>
+              </a:spcBef>
+              <a:spcAft>
+                <a:spcPts val="400"/>
+              </a:spcAft>
+              <a:buClr>
+                <a:srgbClr val="999999"/>
+              </a:buClr>
+              <a:buAutoNum type="arabicPeriod"/>
+            </a:pPr>
+            <a:r>
+              <a:rPr lang="en-GB" dirty="0">
+                <a:solidFill>
+                  <a:srgbClr val="999999"/>
+                </a:solidFill>
+              </a:rPr>
+              <a:t>Questions</a:t>
+            </a:r>
+          </a:p>
+          <a:p>
+            <a:pPr marL="457200" lvl="0" indent="-228600" rtl="0">
+              <a:lnSpc>
+                <a:spcPct val="100000"/>
+              </a:lnSpc>
+              <a:spcBef>
+                <a:spcPts val="0"/>
+              </a:spcBef>
+              <a:spcAft>
+                <a:spcPts val="400"/>
+              </a:spcAft>
+              <a:buClr>
+                <a:srgbClr val="B7B7B7"/>
+              </a:buClr>
+              <a:buAutoNum type="arabicPeriod"/>
+            </a:pPr>
+            <a:r>
+              <a:rPr lang="en-GB" dirty="0">
+                <a:solidFill>
+                  <a:srgbClr val="B7B7B7"/>
+                </a:solidFill>
+              </a:rPr>
+              <a:t>Break</a:t>
+            </a:r>
+          </a:p>
+          <a:p>
+            <a:pPr marL="457200" lvl="0" indent="-228600" rtl="0">
+              <a:lnSpc>
+                <a:spcPct val="100000"/>
+              </a:lnSpc>
+              <a:spcBef>
+                <a:spcPts val="0"/>
+              </a:spcBef>
+              <a:spcAft>
+                <a:spcPts val="400"/>
+              </a:spcAft>
+              <a:buClr>
+                <a:srgbClr val="FFFFFF"/>
+              </a:buClr>
+              <a:buAutoNum type="arabicPeriod"/>
+            </a:pPr>
+            <a:r>
+              <a:rPr lang="en-GB" dirty="0">
+                <a:solidFill>
+                  <a:srgbClr val="FFFFFF"/>
+                </a:solidFill>
+              </a:rPr>
+              <a:t>Pure functions</a:t>
+            </a:r>
+          </a:p>
+          <a:p>
+            <a:pPr marL="457200" lvl="0" indent="-228600" rtl="0">
+              <a:lnSpc>
+                <a:spcPct val="100000"/>
+              </a:lnSpc>
+              <a:spcBef>
+                <a:spcPts val="0"/>
+              </a:spcBef>
+              <a:spcAft>
+                <a:spcPts val="400"/>
+              </a:spcAft>
+              <a:buClr>
+                <a:srgbClr val="FFFFFF"/>
+              </a:buClr>
+              <a:buAutoNum type="arabicPeriod"/>
+            </a:pPr>
+            <a:r>
+              <a:rPr lang="en-GB" dirty="0">
+                <a:solidFill>
+                  <a:srgbClr val="FFFFFF"/>
+                </a:solidFill>
+              </a:rPr>
+              <a:t>Redux - Reducers and Actions</a:t>
+            </a:r>
+          </a:p>
+          <a:p>
+            <a:pPr marL="457200" lvl="0" indent="-228600" rtl="0">
+              <a:lnSpc>
+                <a:spcPct val="100000"/>
+              </a:lnSpc>
+              <a:spcBef>
+                <a:spcPts val="0"/>
+              </a:spcBef>
+              <a:spcAft>
+                <a:spcPts val="400"/>
+              </a:spcAft>
+              <a:buClr>
+                <a:srgbClr val="FFFFFF"/>
+              </a:buClr>
+              <a:buAutoNum type="arabicPeriod"/>
+            </a:pPr>
+            <a:r>
+              <a:rPr lang="en-GB" dirty="0">
+                <a:solidFill>
+                  <a:srgbClr val="FFFFFF"/>
+                </a:solidFill>
+              </a:rPr>
+              <a:t>Let’s build something tiny in React and Redux</a:t>
+            </a:r>
+          </a:p>
+          <a:p>
+            <a:pPr marL="457200" lvl="0" indent="-228600" rtl="0">
+              <a:lnSpc>
+                <a:spcPct val="100000"/>
+              </a:lnSpc>
+              <a:spcBef>
+                <a:spcPts val="0"/>
+              </a:spcBef>
+              <a:spcAft>
+                <a:spcPts val="400"/>
+              </a:spcAft>
+              <a:buClr>
+                <a:schemeClr val="accent5"/>
+              </a:buClr>
+              <a:buAutoNum type="arabicPeriod"/>
+            </a:pPr>
+            <a:r>
+              <a:rPr lang="en-GB" dirty="0">
+                <a:solidFill>
+                  <a:schemeClr val="accent5"/>
+                </a:solidFill>
+              </a:rPr>
+              <a:t>(Time permitting) </a:t>
+            </a:r>
+            <a:r>
+              <a:rPr lang="en-GB" dirty="0" err="1">
+                <a:solidFill>
+                  <a:schemeClr val="accent5"/>
+                </a:solidFill>
+              </a:rPr>
+              <a:t>Webpack</a:t>
+            </a:r>
+            <a:r>
+              <a:rPr lang="en-GB" dirty="0">
+                <a:solidFill>
+                  <a:schemeClr val="accent5"/>
+                </a:solidFill>
+              </a:rPr>
+              <a:t> + Babel // CSS + </a:t>
+            </a:r>
+            <a:r>
+              <a:rPr lang="en-GB" dirty="0" err="1">
+                <a:solidFill>
+                  <a:schemeClr val="accent5"/>
+                </a:solidFill>
+              </a:rPr>
+              <a:t>Webpack</a:t>
+            </a:r>
+            <a:r>
+              <a:rPr lang="en-GB" dirty="0">
+                <a:solidFill>
+                  <a:schemeClr val="accent5"/>
+                </a:solidFill>
+              </a:rPr>
+              <a:t> + React</a:t>
+            </a:r>
+          </a:p>
+          <a:p>
+            <a:pPr marL="457200" lvl="0" indent="-228600" rtl="0">
+              <a:lnSpc>
+                <a:spcPct val="100000"/>
+              </a:lnSpc>
+              <a:spcBef>
+                <a:spcPts val="0"/>
+              </a:spcBef>
+              <a:spcAft>
+                <a:spcPts val="400"/>
+              </a:spcAft>
+              <a:buClr>
+                <a:schemeClr val="accent5"/>
+              </a:buClr>
+              <a:buAutoNum type="arabicPeriod"/>
+            </a:pPr>
+            <a:r>
+              <a:rPr lang="en-GB" dirty="0">
+                <a:solidFill>
+                  <a:schemeClr val="accent5"/>
+                </a:solidFill>
+              </a:rPr>
+              <a:t>AMA</a:t>
+            </a:r>
+          </a:p>
+        </p:txBody>
+      </p:sp>
+    </p:spTree>
+  </p:cSld>
+  <p:clrMapOvr>
+    <a:masterClrMapping/>
+  </p:clrMapOvr>
+  <p:transition xmlns:p14="http://schemas.microsoft.com/office/powerpoint/2010/main" spd="slow">
+    <p:cut/>
+  </p:transition>
+  <p:timing>
+    <p:tnLst>
+      <p:par>
+        <p:cTn xmlns:p14="http://schemas.microsoft.com/office/powerpoint/2010/main" id="1" dur="indefinite" restart="never" nodeType="tmRoot"/>
+      </p:par>
+    </p:tnLst>
+  </p:timing>
+</p:sld>
+</file>
+
+<file path=ppt/slides/slide15.xml><?xml version="1.0" encoding="utf-8"?>
+<p:sld xmlns:a="http://schemas.openxmlformats.org/drawingml/2006/main" xmlns:r="http://schemas.openxmlformats.org/officeDocument/2006/relationships" xmlns:p="http://schemas.openxmlformats.org/presentationml/2006/main">
+  <p:cSld>
+    <p:spTree>
+      <p:nvGrpSpPr>
+        <p:cNvPr id="1" name="Shape 139"/>
+        <p:cNvGrpSpPr/>
+        <p:nvPr/>
+      </p:nvGrpSpPr>
+      <p:grpSpPr>
+        <a:xfrm>
+          <a:off x="0" y="0"/>
+          <a:ext cx="0" cy="0"/>
+          <a:chOff x="0" y="0"/>
+          <a:chExt cx="0" cy="0"/>
+        </a:xfrm>
+      </p:grpSpPr>
+      <p:sp>
+        <p:nvSpPr>
+          <p:cNvPr id="140" name="Shape 140"/>
+          <p:cNvSpPr txBox="1">
+            <a:spLocks noGrp="1"/>
+          </p:cNvSpPr>
+          <p:nvPr>
+            <p:ph type="title"/>
+          </p:nvPr>
+        </p:nvSpPr>
+        <p:spPr>
+          <a:xfrm>
+            <a:off x="671250" y="2141250"/>
+            <a:ext cx="7852200" cy="861000"/>
+          </a:xfrm>
+          <a:prstGeom prst="rect">
+            <a:avLst/>
+          </a:prstGeom>
+        </p:spPr>
+        <p:txBody>
+          <a:bodyPr lIns="91425" tIns="91425" rIns="91425" bIns="91425" anchor="ctr" anchorCtr="0">
+            <a:noAutofit/>
+          </a:bodyPr>
+          <a:lstStyle/>
+          <a:p>
+            <a:pPr lvl="0">
+              <a:spcBef>
+                <a:spcPts val="0"/>
+              </a:spcBef>
+              <a:buNone/>
+            </a:pPr>
+            <a:r>
               <a:rPr lang="en-GB" dirty="0" smtClean="0"/>
               <a:t>To Sublime!</a:t>
             </a:r>
@@ -7224,7 +8076,7 @@
 </p:sld>
 </file>
 
-<file path=ppt/slides/slide14.xml><?xml version="1.0" encoding="utf-8"?>
+<file path=ppt/slides/slide16.xml><?xml version="1.0" encoding="utf-8"?>
 <p:sld xmlns:a="http://schemas.openxmlformats.org/drawingml/2006/main" xmlns:r="http://schemas.openxmlformats.org/officeDocument/2006/relationships" xmlns:p="http://schemas.openxmlformats.org/presentationml/2006/main">
   <p:cSld>
     <p:spTree>
@@ -7444,7 +8296,7 @@
               <a:buNone/>
             </a:pPr>
             <a:r>
-              <a:rPr lang="en-GB"/>
+              <a:rPr lang="en-GB" dirty="0"/>
               <a:t>Agenda</a:t>
             </a:r>
           </a:p>
@@ -8093,59 +8945,75 @@
           </a:bodyPr>
           <a:lstStyle/>
           <a:p>
-            <a:pPr marL="457200" lvl="0" indent="-228600">
+            <a:pPr marL="514350" lvl="0" indent="-285750">
               <a:lnSpc>
                 <a:spcPct val="200000"/>
               </a:lnSpc>
               <a:spcBef>
                 <a:spcPts val="0"/>
               </a:spcBef>
+              <a:buFont typeface="Arial"/>
+              <a:buChar char="•"/>
             </a:pPr>
             <a:r>
-              <a:rPr lang="en-GB"/>
+              <a:rPr lang="en-GB" dirty="0"/>
               <a:t>Client-side rich applications</a:t>
             </a:r>
           </a:p>
           <a:p>
-            <a:pPr marL="457200" lvl="0" indent="-228600" rtl="0">
+            <a:pPr marL="514350" lvl="0" indent="-285750" rtl="0">
               <a:lnSpc>
                 <a:spcPct val="200000"/>
               </a:lnSpc>
               <a:spcBef>
                 <a:spcPts val="0"/>
               </a:spcBef>
+              <a:buFont typeface="Arial"/>
+              <a:buChar char="•"/>
             </a:pPr>
             <a:r>
-              <a:rPr lang="en-GB"/>
+              <a:rPr lang="en-GB" dirty="0"/>
               <a:t>Uses a single HTML page (hence the “single-page” part…)</a:t>
             </a:r>
           </a:p>
           <a:p>
-            <a:pPr marL="457200" lvl="0" indent="-228600" rtl="0">
+            <a:pPr marL="514350" lvl="0" indent="-285750" rtl="0">
               <a:lnSpc>
                 <a:spcPct val="200000"/>
               </a:lnSpc>
               <a:spcBef>
                 <a:spcPts val="0"/>
               </a:spcBef>
+              <a:buFont typeface="Arial"/>
+              <a:buChar char="•"/>
             </a:pPr>
             <a:r>
-              <a:rPr lang="en-GB"/>
+              <a:rPr lang="en-GB" dirty="0"/>
               <a:t>Javascript used to access HTML5 Web APIs</a:t>
             </a:r>
           </a:p>
           <a:p>
-            <a:pPr marL="457200" lvl="0" indent="-228600" rtl="0">
+            <a:pPr marL="514350" lvl="0" indent="-285750" rtl="0">
               <a:lnSpc>
                 <a:spcPct val="200000"/>
               </a:lnSpc>
               <a:spcBef>
                 <a:spcPts val="0"/>
               </a:spcBef>
+              <a:buFont typeface="Arial"/>
+              <a:buChar char="•"/>
             </a:pPr>
             <a:r>
-              <a:rPr lang="en-GB"/>
-              <a:t>AJAX used to communicate with a RESTful API layer (SOA)</a:t>
+              <a:rPr lang="en-GB" dirty="0"/>
+              <a:t>AJAX used to communicate with a </a:t>
+            </a:r>
+            <a:r>
+              <a:rPr lang="en-GB" dirty="0" err="1"/>
+              <a:t>RESTful</a:t>
+            </a:r>
+            <a:r>
+              <a:rPr lang="en-GB" dirty="0"/>
+              <a:t> API layer (SOA)</a:t>
             </a:r>
           </a:p>
         </p:txBody>
@@ -8217,7 +9085,7 @@
               <a:buNone/>
             </a:pPr>
             <a:r>
-              <a:rPr lang="en-GB"/>
+              <a:rPr lang="en-GB" dirty="0"/>
               <a:t>SPAs in 2016</a:t>
             </a:r>
           </a:p>
@@ -8248,58 +9116,73 @@
           </a:bodyPr>
           <a:lstStyle/>
           <a:p>
-            <a:pPr marL="457200" lvl="0" indent="-228600" rtl="0">
+            <a:pPr marL="514350" lvl="0" indent="-285750" rtl="0">
               <a:lnSpc>
                 <a:spcPct val="200000"/>
               </a:lnSpc>
               <a:spcBef>
                 <a:spcPts val="0"/>
               </a:spcBef>
+              <a:buFont typeface="Arial"/>
+              <a:buChar char="•"/>
             </a:pPr>
             <a:r>
-              <a:rPr lang="en-GB"/>
-              <a:t>Using ES6 with Babel to transpile code</a:t>
-            </a:r>
-          </a:p>
-          <a:p>
-            <a:pPr marL="457200" lvl="0" indent="-228600" rtl="0">
+              <a:rPr lang="en-GB" dirty="0"/>
+              <a:t>Using ES6 with Babel to </a:t>
+            </a:r>
+            <a:r>
+              <a:rPr lang="en-GB" dirty="0" err="1"/>
+              <a:t>transpile</a:t>
+            </a:r>
+            <a:r>
+              <a:rPr lang="en-GB" dirty="0"/>
+              <a:t> code</a:t>
+            </a:r>
+          </a:p>
+          <a:p>
+            <a:pPr marL="514350" lvl="0" indent="-285750" rtl="0">
               <a:lnSpc>
                 <a:spcPct val="200000"/>
               </a:lnSpc>
               <a:spcBef>
                 <a:spcPts val="0"/>
               </a:spcBef>
+              <a:buFont typeface="Arial"/>
+              <a:buChar char="•"/>
             </a:pPr>
             <a:r>
-              <a:rPr lang="en-GB"/>
-              <a:t>WTF does transpiling mean? How is that a real word?</a:t>
-            </a:r>
-          </a:p>
-          <a:p>
-            <a:pPr marL="457200" lvl="0" indent="-228600" rtl="0">
+              <a:rPr lang="en-GB" dirty="0"/>
+              <a:t>WTF does </a:t>
+            </a:r>
+            <a:r>
+              <a:rPr lang="en-GB" dirty="0" err="1"/>
+              <a:t>transpiling</a:t>
+            </a:r>
+            <a:r>
+              <a:rPr lang="en-GB" dirty="0"/>
+              <a:t> mean? How is that a real word?</a:t>
+            </a:r>
+          </a:p>
+          <a:p>
+            <a:pPr marL="514350" lvl="0" indent="-285750" rtl="0">
               <a:lnSpc>
                 <a:spcPct val="200000"/>
               </a:lnSpc>
               <a:spcBef>
                 <a:spcPts val="0"/>
               </a:spcBef>
+              <a:buFont typeface="Arial"/>
+              <a:buChar char="•"/>
             </a:pPr>
             <a:r>
-              <a:rPr lang="en-GB"/>
-              <a:t>Code bundling</a:t>
-            </a:r>
-          </a:p>
-          <a:p>
-            <a:pPr lvl="0">
-              <a:lnSpc>
-                <a:spcPct val="200000"/>
-              </a:lnSpc>
-              <a:spcBef>
-                <a:spcPts val="0"/>
-              </a:spcBef>
-              <a:buNone/>
-            </a:pPr>
-            <a:endParaRPr/>
+              <a:rPr lang="en-GB" dirty="0"/>
+              <a:t>Code </a:t>
+            </a:r>
+            <a:r>
+              <a:rPr lang="en-GB" dirty="0" smtClean="0"/>
+              <a:t>bundling</a:t>
+            </a:r>
+            <a:endParaRPr lang="en-GB" dirty="0"/>
           </a:p>
         </p:txBody>
       </p:sp>
@@ -8401,13 +9284,15 @@
           </a:bodyPr>
           <a:lstStyle/>
           <a:p>
-            <a:pPr marL="457200" lvl="0" indent="-228600" rtl="0">
+            <a:pPr marL="514350" lvl="0" indent="-285750" rtl="0">
               <a:lnSpc>
                 <a:spcPct val="200000"/>
               </a:lnSpc>
               <a:spcBef>
                 <a:spcPts val="0"/>
               </a:spcBef>
+              <a:buFont typeface="Arial"/>
+              <a:buChar char="•"/>
             </a:pPr>
             <a:r>
               <a:rPr lang="en-GB" dirty="0"/>
@@ -8415,13 +9300,15 @@
             </a:r>
           </a:p>
           <a:p>
-            <a:pPr marL="457200" lvl="0" indent="-228600" rtl="0">
+            <a:pPr marL="514350" lvl="0" indent="-285750" rtl="0">
               <a:lnSpc>
                 <a:spcPct val="200000"/>
               </a:lnSpc>
               <a:spcBef>
                 <a:spcPts val="0"/>
               </a:spcBef>
+              <a:buFont typeface="Arial"/>
+              <a:buChar char="•"/>
             </a:pPr>
             <a:r>
               <a:rPr lang="en-GB" dirty="0"/>
@@ -8445,13 +9332,15 @@
             </a:r>
           </a:p>
           <a:p>
-            <a:pPr marL="457200" lvl="0" indent="-228600" rtl="0">
+            <a:pPr marL="514350" lvl="0" indent="-285750" rtl="0">
               <a:lnSpc>
                 <a:spcPct val="200000"/>
               </a:lnSpc>
               <a:spcBef>
                 <a:spcPts val="0"/>
               </a:spcBef>
+              <a:buFont typeface="Arial"/>
+              <a:buChar char="•"/>
             </a:pPr>
             <a:r>
               <a:rPr lang="en-GB" dirty="0"/>
@@ -8459,13 +9348,15 @@
             </a:r>
           </a:p>
           <a:p>
-            <a:pPr marL="457200" lvl="0" indent="-228600" rtl="0">
+            <a:pPr marL="514350" lvl="0" indent="-285750" rtl="0">
               <a:lnSpc>
                 <a:spcPct val="200000"/>
               </a:lnSpc>
               <a:spcBef>
                 <a:spcPts val="0"/>
               </a:spcBef>
+              <a:buFont typeface="Arial"/>
+              <a:buChar char="•"/>
             </a:pPr>
             <a:r>
               <a:rPr lang="en-GB" dirty="0"/>

</xml_diff>